<commit_message>
80% for README.md updated
</commit_message>
<xml_diff>
--- a/Cap Stone Fraud-Detection/fraud-detect.pptx
+++ b/Cap Stone Fraud-Detection/fraud-detect.pptx
@@ -6,7 +6,6 @@
   </p:sldMasterIdLst>
   <p:sldIdLst>
     <p:sldId id="256" r:id="rId2"/>
-    <p:sldId id="257" r:id="rId3"/>
   </p:sldIdLst>
   <p:sldSz cx="12192000" cy="6858000"/>
   <p:notesSz cx="6858000" cy="9144000"/>
@@ -105,6 +104,11 @@
       </a:defRPr>
     </a:lvl9pPr>
   </p:defaultTextStyle>
+  <p:extLst>
+    <p:ext uri="{EFAFB233-063F-42B5-8137-9DF3F51BA10A}">
+      <p15:sldGuideLst xmlns:p15="http://schemas.microsoft.com/office/powerpoint/2012/main"/>
+    </p:ext>
+  </p:extLst>
 </p:presentation>
 </file>
 
@@ -257,7 +261,7 @@
           <a:p>
             <a:fld id="{6CD0010E-AEC1-0E48-928E-A747128A5471}" type="datetimeFigureOut">
               <a:rPr lang="en-TH" smtClean="0"/>
-              <a:t>18/10/2021 R</a:t>
+              <a:t>27/10/2021 R</a:t>
             </a:fld>
             <a:endParaRPr lang="en-TH"/>
           </a:p>
@@ -457,7 +461,7 @@
           <a:p>
             <a:fld id="{6CD0010E-AEC1-0E48-928E-A747128A5471}" type="datetimeFigureOut">
               <a:rPr lang="en-TH" smtClean="0"/>
-              <a:t>18/10/2021 R</a:t>
+              <a:t>27/10/2021 R</a:t>
             </a:fld>
             <a:endParaRPr lang="en-TH"/>
           </a:p>
@@ -667,7 +671,7 @@
           <a:p>
             <a:fld id="{6CD0010E-AEC1-0E48-928E-A747128A5471}" type="datetimeFigureOut">
               <a:rPr lang="en-TH" smtClean="0"/>
-              <a:t>18/10/2021 R</a:t>
+              <a:t>27/10/2021 R</a:t>
             </a:fld>
             <a:endParaRPr lang="en-TH"/>
           </a:p>
@@ -867,7 +871,7 @@
           <a:p>
             <a:fld id="{6CD0010E-AEC1-0E48-928E-A747128A5471}" type="datetimeFigureOut">
               <a:rPr lang="en-TH" smtClean="0"/>
-              <a:t>18/10/2021 R</a:t>
+              <a:t>27/10/2021 R</a:t>
             </a:fld>
             <a:endParaRPr lang="en-TH"/>
           </a:p>
@@ -1143,7 +1147,7 @@
           <a:p>
             <a:fld id="{6CD0010E-AEC1-0E48-928E-A747128A5471}" type="datetimeFigureOut">
               <a:rPr lang="en-TH" smtClean="0"/>
-              <a:t>18/10/2021 R</a:t>
+              <a:t>27/10/2021 R</a:t>
             </a:fld>
             <a:endParaRPr lang="en-TH"/>
           </a:p>
@@ -1411,7 +1415,7 @@
           <a:p>
             <a:fld id="{6CD0010E-AEC1-0E48-928E-A747128A5471}" type="datetimeFigureOut">
               <a:rPr lang="en-TH" smtClean="0"/>
-              <a:t>18/10/2021 R</a:t>
+              <a:t>27/10/2021 R</a:t>
             </a:fld>
             <a:endParaRPr lang="en-TH"/>
           </a:p>
@@ -1826,7 +1830,7 @@
           <a:p>
             <a:fld id="{6CD0010E-AEC1-0E48-928E-A747128A5471}" type="datetimeFigureOut">
               <a:rPr lang="en-TH" smtClean="0"/>
-              <a:t>18/10/2021 R</a:t>
+              <a:t>27/10/2021 R</a:t>
             </a:fld>
             <a:endParaRPr lang="en-TH"/>
           </a:p>
@@ -1968,7 +1972,7 @@
           <a:p>
             <a:fld id="{6CD0010E-AEC1-0E48-928E-A747128A5471}" type="datetimeFigureOut">
               <a:rPr lang="en-TH" smtClean="0"/>
-              <a:t>18/10/2021 R</a:t>
+              <a:t>27/10/2021 R</a:t>
             </a:fld>
             <a:endParaRPr lang="en-TH"/>
           </a:p>
@@ -2081,7 +2085,7 @@
           <a:p>
             <a:fld id="{6CD0010E-AEC1-0E48-928E-A747128A5471}" type="datetimeFigureOut">
               <a:rPr lang="en-TH" smtClean="0"/>
-              <a:t>18/10/2021 R</a:t>
+              <a:t>27/10/2021 R</a:t>
             </a:fld>
             <a:endParaRPr lang="en-TH"/>
           </a:p>
@@ -2394,7 +2398,7 @@
           <a:p>
             <a:fld id="{6CD0010E-AEC1-0E48-928E-A747128A5471}" type="datetimeFigureOut">
               <a:rPr lang="en-TH" smtClean="0"/>
-              <a:t>18/10/2021 R</a:t>
+              <a:t>27/10/2021 R</a:t>
             </a:fld>
             <a:endParaRPr lang="en-TH"/>
           </a:p>
@@ -2683,7 +2687,7 @@
           <a:p>
             <a:fld id="{6CD0010E-AEC1-0E48-928E-A747128A5471}" type="datetimeFigureOut">
               <a:rPr lang="en-TH" smtClean="0"/>
-              <a:t>18/10/2021 R</a:t>
+              <a:t>27/10/2021 R</a:t>
             </a:fld>
             <a:endParaRPr lang="en-TH"/>
           </a:p>
@@ -2926,7 +2930,7 @@
           <a:p>
             <a:fld id="{6CD0010E-AEC1-0E48-928E-A747128A5471}" type="datetimeFigureOut">
               <a:rPr lang="en-TH" smtClean="0"/>
-              <a:t>18/10/2021 R</a:t>
+              <a:t>27/10/2021 R</a:t>
             </a:fld>
             <a:endParaRPr lang="en-TH"/>
           </a:p>
@@ -3345,10 +3349,10 @@
       </p:grpSpPr>
       <p:sp>
         <p:nvSpPr>
-          <p:cNvPr id="62" name="Rounded Rectangle 61">
-            <a:extLst>
-              <a:ext uri="{FF2B5EF4-FFF2-40B4-BE49-F238E27FC236}">
-                <a16:creationId xmlns:a16="http://schemas.microsoft.com/office/drawing/2014/main" id="{135754E0-7542-394D-A9BA-B0464AAD2A69}"/>
+          <p:cNvPr id="97" name="Rounded Rectangle 96">
+            <a:extLst>
+              <a:ext uri="{FF2B5EF4-FFF2-40B4-BE49-F238E27FC236}">
+                <a16:creationId xmlns:a16="http://schemas.microsoft.com/office/drawing/2014/main" id="{8895C1AB-A8AA-1D47-9DA0-E2C330965069}"/>
               </a:ext>
             </a:extLst>
           </p:cNvPr>
@@ -3357,16 +3361,16 @@
         </p:nvSpPr>
         <p:spPr>
           <a:xfrm>
-            <a:off x="480339" y="4285681"/>
-            <a:ext cx="1898750" cy="1710519"/>
+            <a:off x="9679477" y="1499122"/>
+            <a:ext cx="1265810" cy="3511049"/>
           </a:xfrm>
           <a:prstGeom prst="roundRect">
             <a:avLst/>
           </a:prstGeom>
           <a:solidFill>
-            <a:schemeClr val="accent1">
-              <a:lumMod val="20000"/>
-              <a:lumOff val="80000"/>
+            <a:schemeClr val="accent5">
+              <a:lumMod val="40000"/>
+              <a:lumOff val="60000"/>
             </a:schemeClr>
           </a:solidFill>
           <a:ln>
@@ -3400,10 +3404,10 @@
       </p:sp>
       <p:sp>
         <p:nvSpPr>
-          <p:cNvPr id="56" name="Rounded Rectangle 55">
-            <a:extLst>
-              <a:ext uri="{FF2B5EF4-FFF2-40B4-BE49-F238E27FC236}">
-                <a16:creationId xmlns:a16="http://schemas.microsoft.com/office/drawing/2014/main" id="{48F88E7B-8A45-C144-8BA9-9C14C6681C24}"/>
+          <p:cNvPr id="75" name="Rounded Rectangle 74">
+            <a:extLst>
+              <a:ext uri="{FF2B5EF4-FFF2-40B4-BE49-F238E27FC236}">
+                <a16:creationId xmlns:a16="http://schemas.microsoft.com/office/drawing/2014/main" id="{E84F17C1-877F-2941-9325-E095CFF8585B}"/>
               </a:ext>
             </a:extLst>
           </p:cNvPr>
@@ -3412,16 +3416,16 @@
         </p:nvSpPr>
         <p:spPr>
           <a:xfrm>
-            <a:off x="4546614" y="3606663"/>
-            <a:ext cx="1884482" cy="1620449"/>
+            <a:off x="8494956" y="2659718"/>
+            <a:ext cx="3461415" cy="1006345"/>
           </a:xfrm>
           <a:prstGeom prst="roundRect">
             <a:avLst/>
           </a:prstGeom>
           <a:solidFill>
-            <a:schemeClr val="accent1">
-              <a:lumMod val="20000"/>
-              <a:lumOff val="80000"/>
+            <a:schemeClr val="accent5">
+              <a:lumMod val="40000"/>
+              <a:lumOff val="60000"/>
             </a:schemeClr>
           </a:solidFill>
           <a:ln>
@@ -3455,10 +3459,10 @@
       </p:sp>
       <p:sp>
         <p:nvSpPr>
-          <p:cNvPr id="55" name="Rounded Rectangle 54">
-            <a:extLst>
-              <a:ext uri="{FF2B5EF4-FFF2-40B4-BE49-F238E27FC236}">
-                <a16:creationId xmlns:a16="http://schemas.microsoft.com/office/drawing/2014/main" id="{7BAB30CD-1FB2-0944-A6BF-24D1A458D7E5}"/>
+          <p:cNvPr id="62" name="Rounded Rectangle 61">
+            <a:extLst>
+              <a:ext uri="{FF2B5EF4-FFF2-40B4-BE49-F238E27FC236}">
+                <a16:creationId xmlns:a16="http://schemas.microsoft.com/office/drawing/2014/main" id="{135754E0-7542-394D-A9BA-B0464AAD2A69}"/>
               </a:ext>
             </a:extLst>
           </p:cNvPr>
@@ -3467,8 +3471,8 @@
         </p:nvSpPr>
         <p:spPr>
           <a:xfrm>
-            <a:off x="4603920" y="1393076"/>
-            <a:ext cx="1244812" cy="879760"/>
+            <a:off x="636357" y="4468582"/>
+            <a:ext cx="979294" cy="863796"/>
           </a:xfrm>
           <a:prstGeom prst="roundRect">
             <a:avLst/>
@@ -3504,16 +3508,16 @@
           <a:lstStyle/>
           <a:p>
             <a:pPr algn="ctr"/>
-            <a:endParaRPr lang="en-TH" dirty="0"/>
-          </a:p>
-        </p:txBody>
-      </p:sp>
-      <p:sp>
-        <p:nvSpPr>
-          <p:cNvPr id="26" name="Rounded Rectangle 25">
-            <a:extLst>
-              <a:ext uri="{FF2B5EF4-FFF2-40B4-BE49-F238E27FC236}">
-                <a16:creationId xmlns:a16="http://schemas.microsoft.com/office/drawing/2014/main" id="{4A6EDCFF-B07B-D444-9F1D-4179E8E71DCE}"/>
+            <a:endParaRPr lang="en-TH"/>
+          </a:p>
+        </p:txBody>
+      </p:sp>
+      <p:sp>
+        <p:nvSpPr>
+          <p:cNvPr id="56" name="Rounded Rectangle 55">
+            <a:extLst>
+              <a:ext uri="{FF2B5EF4-FFF2-40B4-BE49-F238E27FC236}">
+                <a16:creationId xmlns:a16="http://schemas.microsoft.com/office/drawing/2014/main" id="{48F88E7B-8A45-C144-8BA9-9C14C6681C24}"/>
               </a:ext>
             </a:extLst>
           </p:cNvPr>
@@ -3522,8 +3526,8 @@
         </p:nvSpPr>
         <p:spPr>
           <a:xfrm>
-            <a:off x="1170006" y="2589548"/>
-            <a:ext cx="3010876" cy="879760"/>
+            <a:off x="3998381" y="3876744"/>
+            <a:ext cx="1884482" cy="1620449"/>
           </a:xfrm>
           <a:prstGeom prst="roundRect">
             <a:avLst/>
@@ -3565,6 +3569,116 @@
       </p:sp>
       <p:sp>
         <p:nvSpPr>
+          <p:cNvPr id="55" name="Rounded Rectangle 54">
+            <a:extLst>
+              <a:ext uri="{FF2B5EF4-FFF2-40B4-BE49-F238E27FC236}">
+                <a16:creationId xmlns:a16="http://schemas.microsoft.com/office/drawing/2014/main" id="{7BAB30CD-1FB2-0944-A6BF-24D1A458D7E5}"/>
+              </a:ext>
+            </a:extLst>
+          </p:cNvPr>
+          <p:cNvSpPr/>
+          <p:nvPr/>
+        </p:nvSpPr>
+        <p:spPr>
+          <a:xfrm>
+            <a:off x="4055687" y="1663157"/>
+            <a:ext cx="1244812" cy="879760"/>
+          </a:xfrm>
+          <a:prstGeom prst="roundRect">
+            <a:avLst/>
+          </a:prstGeom>
+          <a:solidFill>
+            <a:schemeClr val="accent1">
+              <a:lumMod val="20000"/>
+              <a:lumOff val="80000"/>
+            </a:schemeClr>
+          </a:solidFill>
+          <a:ln>
+            <a:noFill/>
+          </a:ln>
+        </p:spPr>
+        <p:style>
+          <a:lnRef idx="2">
+            <a:schemeClr val="accent1">
+              <a:shade val="50000"/>
+            </a:schemeClr>
+          </a:lnRef>
+          <a:fillRef idx="1">
+            <a:schemeClr val="accent1"/>
+          </a:fillRef>
+          <a:effectRef idx="0">
+            <a:schemeClr val="accent1"/>
+          </a:effectRef>
+          <a:fontRef idx="minor">
+            <a:schemeClr val="lt1"/>
+          </a:fontRef>
+        </p:style>
+        <p:txBody>
+          <a:bodyPr rtlCol="0" anchor="ctr"/>
+          <a:lstStyle/>
+          <a:p>
+            <a:pPr algn="ctr"/>
+            <a:endParaRPr lang="en-TH" dirty="0"/>
+          </a:p>
+        </p:txBody>
+      </p:sp>
+      <p:sp>
+        <p:nvSpPr>
+          <p:cNvPr id="26" name="Rounded Rectangle 25">
+            <a:extLst>
+              <a:ext uri="{FF2B5EF4-FFF2-40B4-BE49-F238E27FC236}">
+                <a16:creationId xmlns:a16="http://schemas.microsoft.com/office/drawing/2014/main" id="{4A6EDCFF-B07B-D444-9F1D-4179E8E71DCE}"/>
+              </a:ext>
+            </a:extLst>
+          </p:cNvPr>
+          <p:cNvSpPr/>
+          <p:nvPr/>
+        </p:nvSpPr>
+        <p:spPr>
+          <a:xfrm>
+            <a:off x="621773" y="2859629"/>
+            <a:ext cx="3010876" cy="879760"/>
+          </a:xfrm>
+          <a:prstGeom prst="roundRect">
+            <a:avLst/>
+          </a:prstGeom>
+          <a:solidFill>
+            <a:schemeClr val="accent5">
+              <a:lumMod val="40000"/>
+              <a:lumOff val="60000"/>
+            </a:schemeClr>
+          </a:solidFill>
+          <a:ln>
+            <a:noFill/>
+          </a:ln>
+        </p:spPr>
+        <p:style>
+          <a:lnRef idx="2">
+            <a:schemeClr val="accent1">
+              <a:shade val="50000"/>
+            </a:schemeClr>
+          </a:lnRef>
+          <a:fillRef idx="1">
+            <a:schemeClr val="accent1"/>
+          </a:fillRef>
+          <a:effectRef idx="0">
+            <a:schemeClr val="accent1"/>
+          </a:effectRef>
+          <a:fontRef idx="minor">
+            <a:schemeClr val="lt1"/>
+          </a:fontRef>
+        </p:style>
+        <p:txBody>
+          <a:bodyPr rtlCol="0" anchor="ctr"/>
+          <a:lstStyle/>
+          <a:p>
+            <a:pPr algn="ctr"/>
+            <a:endParaRPr lang="en-TH"/>
+          </a:p>
+        </p:txBody>
+      </p:sp>
+      <p:sp>
+        <p:nvSpPr>
           <p:cNvPr id="3" name="Subtitle 2">
             <a:extLst>
               <a:ext uri="{FF2B5EF4-FFF2-40B4-BE49-F238E27FC236}">
@@ -3581,7 +3695,7 @@
         </p:nvSpPr>
         <p:spPr>
           <a:xfrm>
-            <a:off x="388882" y="480466"/>
+            <a:off x="261670" y="378045"/>
             <a:ext cx="6877968" cy="486486"/>
           </a:xfrm>
         </p:spPr>
@@ -3592,7 +3706,11 @@
           <a:lstStyle/>
           <a:p>
             <a:r>
-              <a:rPr lang="en-TH" dirty="0"/>
+              <a:rPr lang="en-TH" b="1" dirty="0">
+                <a:solidFill>
+                  <a:schemeClr val="accent5"/>
+                </a:solidFill>
+              </a:rPr>
               <a:t>Fraud Detcection – Azure ML Pipeline Architecture </a:t>
             </a:r>
           </a:p>
@@ -3600,10 +3718,10 @@
       </p:sp>
       <p:pic>
         <p:nvPicPr>
-          <p:cNvPr id="11" name="Graphic 10">
-            <a:extLst>
-              <a:ext uri="{FF2B5EF4-FFF2-40B4-BE49-F238E27FC236}">
-                <a16:creationId xmlns:a16="http://schemas.microsoft.com/office/drawing/2014/main" id="{BB85D9E2-B208-5946-AA5D-62E4A190056C}"/>
+          <p:cNvPr id="14" name="Graphic 13">
+            <a:extLst>
+              <a:ext uri="{FF2B5EF4-FFF2-40B4-BE49-F238E27FC236}">
+                <a16:creationId xmlns:a16="http://schemas.microsoft.com/office/drawing/2014/main" id="{3B6B6EA8-EE2E-384F-8D1C-774FA169CD03}"/>
               </a:ext>
             </a:extLst>
           </p:cNvPr>
@@ -3626,8 +3744,8 @@
         </p:blipFill>
         <p:spPr>
           <a:xfrm>
-            <a:off x="1691339" y="4353362"/>
-            <a:ext cx="393491" cy="393491"/>
+            <a:off x="844708" y="4638790"/>
+            <a:ext cx="437443" cy="437443"/>
           </a:xfrm>
           <a:prstGeom prst="rect">
             <a:avLst/>
@@ -3636,46 +3754,10 @@
       </p:pic>
       <p:pic>
         <p:nvPicPr>
-          <p:cNvPr id="14" name="Graphic 13">
-            <a:extLst>
-              <a:ext uri="{FF2B5EF4-FFF2-40B4-BE49-F238E27FC236}">
-                <a16:creationId xmlns:a16="http://schemas.microsoft.com/office/drawing/2014/main" id="{3B6B6EA8-EE2E-384F-8D1C-774FA169CD03}"/>
-              </a:ext>
-            </a:extLst>
-          </p:cNvPr>
-          <p:cNvPicPr>
-            <a:picLocks noChangeAspect="1"/>
-          </p:cNvPicPr>
-          <p:nvPr/>
-        </p:nvPicPr>
-        <p:blipFill>
-          <a:blip r:embed="rId4">
-            <a:extLst>
-              <a:ext uri="{96DAC541-7B7A-43D3-8B79-37D633B846F1}">
-                <asvg:svgBlip xmlns:asvg="http://schemas.microsoft.com/office/drawing/2016/SVG/main" r:embed="rId5"/>
-              </a:ext>
-            </a:extLst>
-          </a:blip>
-          <a:stretch>
-            <a:fillRect/>
-          </a:stretch>
-        </p:blipFill>
-        <p:spPr>
-          <a:xfrm>
-            <a:off x="1942184" y="3941975"/>
-            <a:ext cx="316488" cy="316488"/>
-          </a:xfrm>
-          <a:prstGeom prst="rect">
-            <a:avLst/>
-          </a:prstGeom>
-        </p:spPr>
-      </p:pic>
-      <p:pic>
-        <p:nvPicPr>
-          <p:cNvPr id="1036" name="Picture 12" descr="IoT Summit 2020">
-            <a:extLst>
-              <a:ext uri="{FF2B5EF4-FFF2-40B4-BE49-F238E27FC236}">
-                <a16:creationId xmlns:a16="http://schemas.microsoft.com/office/drawing/2014/main" id="{30BD5B6B-2147-5347-9D09-70357BF80EE4}"/>
+          <p:cNvPr id="1038" name="Picture 14" descr="Azure Storage Tutorial - An Introduction to Azure Storage | Edureka">
+            <a:extLst>
+              <a:ext uri="{FF2B5EF4-FFF2-40B4-BE49-F238E27FC236}">
+                <a16:creationId xmlns:a16="http://schemas.microsoft.com/office/drawing/2014/main" id="{8846E854-59AE-B743-8E8F-E0A630A85F76}"/>
               </a:ext>
             </a:extLst>
           </p:cNvPr>
@@ -3685,7 +3767,7 @@
           <p:nvPr/>
         </p:nvPicPr>
         <p:blipFill>
-          <a:blip r:embed="rId6">
+          <a:blip r:embed="rId4">
             <a:extLst>
               <a:ext uri="{28A0092B-C50C-407E-A947-70E740481C1C}">
                 <a14:useLocalDpi xmlns:a14="http://schemas.microsoft.com/office/drawing/2010/main" val="0"/>
@@ -3698,9 +3780,9 @@
           </a:stretch>
         </p:blipFill>
         <p:spPr bwMode="auto">
-          <a:xfrm>
-            <a:off x="1675630" y="5227112"/>
-            <a:ext cx="412579" cy="412579"/>
+          <a:xfrm flipH="1">
+            <a:off x="946437" y="2984182"/>
+            <a:ext cx="490745" cy="490745"/>
           </a:xfrm>
           <a:prstGeom prst="rect">
             <a:avLst/>
@@ -3719,46 +3801,10 @@
       </p:pic>
       <p:pic>
         <p:nvPicPr>
-          <p:cNvPr id="27" name="Graphic 26">
-            <a:extLst>
-              <a:ext uri="{FF2B5EF4-FFF2-40B4-BE49-F238E27FC236}">
-                <a16:creationId xmlns:a16="http://schemas.microsoft.com/office/drawing/2014/main" id="{1F4D33A2-11B2-A248-87D8-FFDE211ACE4B}"/>
-              </a:ext>
-            </a:extLst>
-          </p:cNvPr>
-          <p:cNvPicPr>
-            <a:picLocks noChangeAspect="1"/>
-          </p:cNvPicPr>
-          <p:nvPr/>
-        </p:nvPicPr>
-        <p:blipFill>
-          <a:blip r:embed="rId7">
-            <a:extLst>
-              <a:ext uri="{96DAC541-7B7A-43D3-8B79-37D633B846F1}">
-                <asvg:svgBlip xmlns:asvg="http://schemas.microsoft.com/office/drawing/2016/SVG/main" r:embed="rId8"/>
-              </a:ext>
-            </a:extLst>
-          </a:blip>
-          <a:stretch>
-            <a:fillRect/>
-          </a:stretch>
-        </p:blipFill>
-        <p:spPr>
-          <a:xfrm>
-            <a:off x="9212184" y="3728708"/>
-            <a:ext cx="1376024" cy="1376024"/>
-          </a:xfrm>
-          <a:prstGeom prst="rect">
-            <a:avLst/>
-          </a:prstGeom>
-        </p:spPr>
-      </p:pic>
-      <p:pic>
-        <p:nvPicPr>
-          <p:cNvPr id="1038" name="Picture 14" descr="Azure Storage Tutorial - An Introduction to Azure Storage | Edureka">
-            <a:extLst>
-              <a:ext uri="{FF2B5EF4-FFF2-40B4-BE49-F238E27FC236}">
-                <a16:creationId xmlns:a16="http://schemas.microsoft.com/office/drawing/2014/main" id="{8846E854-59AE-B743-8E8F-E0A630A85F76}"/>
+          <p:cNvPr id="1046" name="Picture 22">
+            <a:extLst>
+              <a:ext uri="{FF2B5EF4-FFF2-40B4-BE49-F238E27FC236}">
+                <a16:creationId xmlns:a16="http://schemas.microsoft.com/office/drawing/2014/main" id="{703565F2-1166-B641-9852-92656EF496CB}"/>
               </a:ext>
             </a:extLst>
           </p:cNvPr>
@@ -3768,7 +3814,7 @@
           <p:nvPr/>
         </p:nvPicPr>
         <p:blipFill>
-          <a:blip r:embed="rId9">
+          <a:blip r:embed="rId5">
             <a:extLst>
               <a:ext uri="{28A0092B-C50C-407E-A947-70E740481C1C}">
                 <a14:useLocalDpi xmlns:a14="http://schemas.microsoft.com/office/drawing/2010/main" val="0"/>
@@ -3781,9 +3827,9 @@
           </a:stretch>
         </p:blipFill>
         <p:spPr bwMode="auto">
-          <a:xfrm flipH="1">
-            <a:off x="1494670" y="2714101"/>
-            <a:ext cx="490745" cy="490745"/>
+          <a:xfrm>
+            <a:off x="2002148" y="2983256"/>
+            <a:ext cx="440080" cy="510101"/>
           </a:xfrm>
           <a:prstGeom prst="rect">
             <a:avLst/>
@@ -3800,48 +3846,12 @@
           </a:extLst>
         </p:spPr>
       </p:pic>
-      <p:pic>
-        <p:nvPicPr>
-          <p:cNvPr id="23" name="Graphic 22">
-            <a:extLst>
-              <a:ext uri="{FF2B5EF4-FFF2-40B4-BE49-F238E27FC236}">
-                <a16:creationId xmlns:a16="http://schemas.microsoft.com/office/drawing/2014/main" id="{F27B807F-BCAA-AE4A-BB9C-250715F19C63}"/>
-              </a:ext>
-            </a:extLst>
-          </p:cNvPr>
-          <p:cNvPicPr>
-            <a:picLocks noChangeAspect="1"/>
-          </p:cNvPicPr>
-          <p:nvPr/>
-        </p:nvPicPr>
-        <p:blipFill>
-          <a:blip r:embed="rId10">
-            <a:extLst>
-              <a:ext uri="{96DAC541-7B7A-43D3-8B79-37D633B846F1}">
-                <asvg:svgBlip xmlns:asvg="http://schemas.microsoft.com/office/drawing/2016/SVG/main" r:embed="rId11"/>
-              </a:ext>
-            </a:extLst>
-          </a:blip>
-          <a:stretch>
-            <a:fillRect/>
-          </a:stretch>
-        </p:blipFill>
-        <p:spPr>
-          <a:xfrm>
-            <a:off x="10056765" y="2751007"/>
-            <a:ext cx="332926" cy="332926"/>
-          </a:xfrm>
-          <a:prstGeom prst="rect">
-            <a:avLst/>
-          </a:prstGeom>
-        </p:spPr>
-      </p:pic>
       <p:grpSp>
         <p:nvGrpSpPr>
-          <p:cNvPr id="30" name="Group 29">
-            <a:extLst>
-              <a:ext uri="{FF2B5EF4-FFF2-40B4-BE49-F238E27FC236}">
-                <a16:creationId xmlns:a16="http://schemas.microsoft.com/office/drawing/2014/main" id="{608E4F59-BAF5-3B46-8249-F9E10FBA817E}"/>
+          <p:cNvPr id="29" name="Group 28">
+            <a:extLst>
+              <a:ext uri="{FF2B5EF4-FFF2-40B4-BE49-F238E27FC236}">
+                <a16:creationId xmlns:a16="http://schemas.microsoft.com/office/drawing/2014/main" id="{29E53FF0-4F40-924B-8120-877AE94FE12D}"/>
               </a:ext>
             </a:extLst>
           </p:cNvPr>
@@ -3850,230 +3860,7 @@
         </p:nvGrpSpPr>
         <p:grpSpPr>
           <a:xfrm>
-            <a:off x="542667" y="4790941"/>
-            <a:ext cx="744254" cy="753350"/>
-            <a:chOff x="535071" y="5091463"/>
-            <a:chExt cx="744254" cy="753350"/>
-          </a:xfrm>
-        </p:grpSpPr>
-        <p:pic>
-          <p:nvPicPr>
-            <p:cNvPr id="25" name="Graphic 24">
-              <a:extLst>
-                <a:ext uri="{FF2B5EF4-FFF2-40B4-BE49-F238E27FC236}">
-                  <a16:creationId xmlns:a16="http://schemas.microsoft.com/office/drawing/2014/main" id="{61B04363-90CB-CF48-BEB5-4F1A26F4A603}"/>
-                </a:ext>
-              </a:extLst>
-            </p:cNvPr>
-            <p:cNvPicPr>
-              <a:picLocks noChangeAspect="1"/>
-            </p:cNvPicPr>
-            <p:nvPr/>
-          </p:nvPicPr>
-          <p:blipFill>
-            <a:blip r:embed="rId12">
-              <a:extLst>
-                <a:ext uri="{96DAC541-7B7A-43D3-8B79-37D633B846F1}">
-                  <asvg:svgBlip xmlns:asvg="http://schemas.microsoft.com/office/drawing/2016/SVG/main" r:embed="rId13"/>
-                </a:ext>
-              </a:extLst>
-            </a:blip>
-            <a:stretch>
-              <a:fillRect/>
-            </a:stretch>
-          </p:blipFill>
-          <p:spPr>
-            <a:xfrm>
-              <a:off x="535071" y="5091463"/>
-              <a:ext cx="486486" cy="486486"/>
-            </a:xfrm>
-            <a:prstGeom prst="rect">
-              <a:avLst/>
-            </a:prstGeom>
-          </p:spPr>
-        </p:pic>
-        <p:pic>
-          <p:nvPicPr>
-            <p:cNvPr id="34" name="Graphic 33">
-              <a:extLst>
-                <a:ext uri="{FF2B5EF4-FFF2-40B4-BE49-F238E27FC236}">
-                  <a16:creationId xmlns:a16="http://schemas.microsoft.com/office/drawing/2014/main" id="{A452E50C-CC37-8B4C-9FAA-4AA52AD52C7E}"/>
-                </a:ext>
-              </a:extLst>
-            </p:cNvPr>
-            <p:cNvPicPr>
-              <a:picLocks noChangeAspect="1"/>
-            </p:cNvPicPr>
-            <p:nvPr/>
-          </p:nvPicPr>
-          <p:blipFill>
-            <a:blip r:embed="rId12">
-              <a:extLst>
-                <a:ext uri="{96DAC541-7B7A-43D3-8B79-37D633B846F1}">
-                  <asvg:svgBlip xmlns:asvg="http://schemas.microsoft.com/office/drawing/2016/SVG/main" r:embed="rId13"/>
-                </a:ext>
-              </a:extLst>
-            </a:blip>
-            <a:stretch>
-              <a:fillRect/>
-            </a:stretch>
-          </p:blipFill>
-          <p:spPr>
-            <a:xfrm>
-              <a:off x="644874" y="5224895"/>
-              <a:ext cx="486486" cy="486486"/>
-            </a:xfrm>
-            <a:prstGeom prst="rect">
-              <a:avLst/>
-            </a:prstGeom>
-          </p:spPr>
-        </p:pic>
-        <p:pic>
-          <p:nvPicPr>
-            <p:cNvPr id="35" name="Graphic 34">
-              <a:extLst>
-                <a:ext uri="{FF2B5EF4-FFF2-40B4-BE49-F238E27FC236}">
-                  <a16:creationId xmlns:a16="http://schemas.microsoft.com/office/drawing/2014/main" id="{315D73F1-9ACB-744A-A6A8-77B6B1C3E4BC}"/>
-                </a:ext>
-              </a:extLst>
-            </p:cNvPr>
-            <p:cNvPicPr>
-              <a:picLocks noChangeAspect="1"/>
-            </p:cNvPicPr>
-            <p:nvPr/>
-          </p:nvPicPr>
-          <p:blipFill>
-            <a:blip r:embed="rId12">
-              <a:extLst>
-                <a:ext uri="{96DAC541-7B7A-43D3-8B79-37D633B846F1}">
-                  <asvg:svgBlip xmlns:asvg="http://schemas.microsoft.com/office/drawing/2016/SVG/main" r:embed="rId13"/>
-                </a:ext>
-              </a:extLst>
-            </a:blip>
-            <a:stretch>
-              <a:fillRect/>
-            </a:stretch>
-          </p:blipFill>
-          <p:spPr>
-            <a:xfrm>
-              <a:off x="792839" y="5358327"/>
-              <a:ext cx="486486" cy="486486"/>
-            </a:xfrm>
-            <a:prstGeom prst="rect">
-              <a:avLst/>
-            </a:prstGeom>
-          </p:spPr>
-        </p:pic>
-      </p:grpSp>
-      <p:pic>
-        <p:nvPicPr>
-          <p:cNvPr id="36" name="Picture 14" descr="Azure Storage Tutorial - An Introduction to Azure Storage | Edureka">
-            <a:extLst>
-              <a:ext uri="{FF2B5EF4-FFF2-40B4-BE49-F238E27FC236}">
-                <a16:creationId xmlns:a16="http://schemas.microsoft.com/office/drawing/2014/main" id="{DFE1F79D-01BA-C84F-A5FF-6D81BA6E2026}"/>
-              </a:ext>
-            </a:extLst>
-          </p:cNvPr>
-          <p:cNvPicPr>
-            <a:picLocks noChangeAspect="1" noChangeArrowheads="1"/>
-          </p:cNvPicPr>
-          <p:nvPr/>
-        </p:nvPicPr>
-        <p:blipFill>
-          <a:blip r:embed="rId9">
-            <a:extLst>
-              <a:ext uri="{28A0092B-C50C-407E-A947-70E740481C1C}">
-                <a14:useLocalDpi xmlns:a14="http://schemas.microsoft.com/office/drawing/2010/main" val="0"/>
-              </a:ext>
-            </a:extLst>
-          </a:blip>
-          <a:srcRect/>
-          <a:stretch>
-            <a:fillRect/>
-          </a:stretch>
-        </p:blipFill>
-        <p:spPr bwMode="auto">
-          <a:xfrm flipH="1">
-            <a:off x="7971135" y="5149477"/>
-            <a:ext cx="561904" cy="561904"/>
-          </a:xfrm>
-          <a:prstGeom prst="rect">
-            <a:avLst/>
-          </a:prstGeom>
-          <a:noFill/>
-          <a:extLst>
-            <a:ext uri="{909E8E84-426E-40DD-AFC4-6F175D3DCCD1}">
-              <a14:hiddenFill xmlns:a14="http://schemas.microsoft.com/office/drawing/2010/main">
-                <a:solidFill>
-                  <a:srgbClr val="FFFFFF"/>
-                </a:solidFill>
-              </a14:hiddenFill>
-            </a:ext>
-          </a:extLst>
-        </p:spPr>
-      </p:pic>
-      <p:pic>
-        <p:nvPicPr>
-          <p:cNvPr id="1046" name="Picture 22">
-            <a:extLst>
-              <a:ext uri="{FF2B5EF4-FFF2-40B4-BE49-F238E27FC236}">
-                <a16:creationId xmlns:a16="http://schemas.microsoft.com/office/drawing/2014/main" id="{703565F2-1166-B641-9852-92656EF496CB}"/>
-              </a:ext>
-            </a:extLst>
-          </p:cNvPr>
-          <p:cNvPicPr>
-            <a:picLocks noChangeAspect="1" noChangeArrowheads="1"/>
-          </p:cNvPicPr>
-          <p:nvPr/>
-        </p:nvPicPr>
-        <p:blipFill>
-          <a:blip r:embed="rId14">
-            <a:extLst>
-              <a:ext uri="{28A0092B-C50C-407E-A947-70E740481C1C}">
-                <a14:useLocalDpi xmlns:a14="http://schemas.microsoft.com/office/drawing/2010/main" val="0"/>
-              </a:ext>
-            </a:extLst>
-          </a:blip>
-          <a:srcRect/>
-          <a:stretch>
-            <a:fillRect/>
-          </a:stretch>
-        </p:blipFill>
-        <p:spPr bwMode="auto">
-          <a:xfrm>
-            <a:off x="2550381" y="2713175"/>
-            <a:ext cx="440080" cy="510101"/>
-          </a:xfrm>
-          <a:prstGeom prst="rect">
-            <a:avLst/>
-          </a:prstGeom>
-          <a:noFill/>
-          <a:extLst>
-            <a:ext uri="{909E8E84-426E-40DD-AFC4-6F175D3DCCD1}">
-              <a14:hiddenFill xmlns:a14="http://schemas.microsoft.com/office/drawing/2010/main">
-                <a:solidFill>
-                  <a:srgbClr val="FFFFFF"/>
-                </a:solidFill>
-              </a14:hiddenFill>
-            </a:ext>
-          </a:extLst>
-        </p:spPr>
-      </p:pic>
-      <p:grpSp>
-        <p:nvGrpSpPr>
-          <p:cNvPr id="29" name="Group 28">
-            <a:extLst>
-              <a:ext uri="{FF2B5EF4-FFF2-40B4-BE49-F238E27FC236}">
-                <a16:creationId xmlns:a16="http://schemas.microsoft.com/office/drawing/2014/main" id="{29E53FF0-4F40-924B-8120-877AE94FE12D}"/>
-              </a:ext>
-            </a:extLst>
-          </p:cNvPr>
-          <p:cNvGrpSpPr/>
-          <p:nvPr/>
-        </p:nvGrpSpPr>
-        <p:grpSpPr>
-          <a:xfrm>
-            <a:off x="3790766" y="2303335"/>
+            <a:off x="3242533" y="2573416"/>
             <a:ext cx="458121" cy="394245"/>
             <a:chOff x="3627237" y="2135301"/>
             <a:chExt cx="662265" cy="569925"/>
@@ -4094,11 +3881,11 @@
             <p:nvPr/>
           </p:nvPicPr>
           <p:blipFill>
-            <a:blip r:embed="rId15">
+            <a:blip r:embed="rId6">
               <a:extLst>
                 <a:ext uri="{BEBA8EAE-BF5A-486C-A8C5-ECC9F3942E4B}">
                   <a14:imgProps xmlns:a14="http://schemas.microsoft.com/office/drawing/2010/main">
-                    <a14:imgLayer r:embed="rId16">
+                    <a14:imgLayer r:embed="rId7">
                       <a14:imgEffect>
                         <a14:backgroundRemoval t="1778" b="96889" l="4000" r="93778">
                           <a14:foregroundMark x1="56444" y1="6667" x2="49333" y2="8889"/>
@@ -4167,11 +3954,11 @@
             <p:nvPr/>
           </p:nvPicPr>
           <p:blipFill rotWithShape="1">
-            <a:blip r:embed="rId17">
+            <a:blip r:embed="rId8">
               <a:extLst>
                 <a:ext uri="{BEBA8EAE-BF5A-486C-A8C5-ECC9F3942E4B}">
                   <a14:imgProps xmlns:a14="http://schemas.microsoft.com/office/drawing/2010/main">
-                    <a14:imgLayer r:embed="rId18">
+                    <a14:imgLayer r:embed="rId9">
                       <a14:imgEffect>
                         <a14:backgroundRemoval t="36000" b="64667" l="69167" r="99167">
                           <a14:foregroundMark x1="69583" y1="45333" x2="69583" y2="58667"/>
@@ -4234,11 +4021,11 @@
           <p:nvPr/>
         </p:nvPicPr>
         <p:blipFill rotWithShape="1">
-          <a:blip r:embed="rId19">
+          <a:blip r:embed="rId10">
             <a:extLst>
               <a:ext uri="{BEBA8EAE-BF5A-486C-A8C5-ECC9F3942E4B}">
                 <a14:imgProps xmlns:a14="http://schemas.microsoft.com/office/drawing/2010/main">
-                  <a14:imgLayer r:embed="rId20">
+                  <a14:imgLayer r:embed="rId11">
                     <a14:imgEffect>
                       <a14:backgroundRemoval t="31915" b="61277" l="52239" r="71642">
                         <a14:foregroundMark x1="51173" y1="56596" x2="56716" y2="61277"/>
@@ -4262,7 +4049,7 @@
         </p:blipFill>
         <p:spPr bwMode="auto">
           <a:xfrm>
-            <a:off x="4871512" y="1412821"/>
+            <a:off x="4323279" y="1682902"/>
             <a:ext cx="724205" cy="553061"/>
           </a:xfrm>
           <a:prstGeom prst="rect">
@@ -4295,11 +4082,11 @@
           <p:nvPr/>
         </p:nvPicPr>
         <p:blipFill>
-          <a:blip r:embed="rId21">
+          <a:blip r:embed="rId12">
             <a:extLst>
               <a:ext uri="{BEBA8EAE-BF5A-486C-A8C5-ECC9F3942E4B}">
                 <a14:imgProps xmlns:a14="http://schemas.microsoft.com/office/drawing/2010/main">
-                  <a14:imgLayer r:embed="rId22">
+                  <a14:imgLayer r:embed="rId13">
                     <a14:imgEffect>
                       <a14:backgroundRemoval t="10000" b="90000" l="10000" r="90000">
                         <a14:foregroundMark x1="10667" y1="75333" x2="17667" y2="87667"/>
@@ -4322,7 +4109,7 @@
         </p:blipFill>
         <p:spPr bwMode="auto">
           <a:xfrm>
-            <a:off x="6685462" y="2458858"/>
+            <a:off x="6142755" y="2677333"/>
             <a:ext cx="534495" cy="534495"/>
           </a:xfrm>
           <a:prstGeom prst="rect">
@@ -4355,7 +4142,7 @@
           <p:nvPr/>
         </p:nvPicPr>
         <p:blipFill>
-          <a:blip r:embed="rId23">
+          <a:blip r:embed="rId14">
             <a:extLst>
               <a:ext uri="{28A0092B-C50C-407E-A947-70E740481C1C}">
                 <a14:useLocalDpi xmlns:a14="http://schemas.microsoft.com/office/drawing/2010/main" val="0"/>
@@ -4369,7 +4156,7 @@
         </p:blipFill>
         <p:spPr bwMode="auto">
           <a:xfrm>
-            <a:off x="4957148" y="3649110"/>
+            <a:off x="4408915" y="3919191"/>
             <a:ext cx="1001012" cy="500506"/>
           </a:xfrm>
           <a:prstGeom prst="rect">
@@ -4402,11 +4189,11 @@
           <p:nvPr/>
         </p:nvPicPr>
         <p:blipFill>
-          <a:blip r:embed="rId24">
+          <a:blip r:embed="rId15">
             <a:extLst>
               <a:ext uri="{BEBA8EAE-BF5A-486C-A8C5-ECC9F3942E4B}">
                 <a14:imgProps xmlns:a14="http://schemas.microsoft.com/office/drawing/2010/main">
-                  <a14:imgLayer r:embed="rId25">
+                  <a14:imgLayer r:embed="rId16">
                     <a14:imgEffect>
                       <a14:backgroundRemoval t="7556" b="93778" l="1778" r="96889">
                         <a14:foregroundMark x1="44444" y1="44000" x2="44444" y2="44000"/>
@@ -4437,7 +4224,7 @@
         </p:blipFill>
         <p:spPr bwMode="auto">
           <a:xfrm>
-            <a:off x="5254574" y="4368709"/>
+            <a:off x="4706341" y="4638790"/>
             <a:ext cx="406159" cy="406159"/>
           </a:xfrm>
           <a:prstGeom prst="rect">
@@ -4469,7 +4256,7 @@
         </p:nvSpPr>
         <p:spPr>
           <a:xfrm>
-            <a:off x="4546614" y="4003024"/>
+            <a:off x="3998381" y="4273105"/>
             <a:ext cx="1956613" cy="261610"/>
           </a:xfrm>
           <a:prstGeom prst="rect">
@@ -4505,7 +4292,7 @@
         </p:nvSpPr>
         <p:spPr>
           <a:xfrm>
-            <a:off x="4596290" y="4740099"/>
+            <a:off x="4048057" y="5010180"/>
             <a:ext cx="1776979" cy="430887"/>
           </a:xfrm>
           <a:prstGeom prst="rect">
@@ -4549,7 +4336,7 @@
         </p:nvSpPr>
         <p:spPr>
           <a:xfrm>
-            <a:off x="4895012" y="1970324"/>
+            <a:off x="4346779" y="2240405"/>
             <a:ext cx="724205" cy="261610"/>
           </a:xfrm>
           <a:prstGeom prst="rect">
@@ -4585,7 +4372,7 @@
         </p:nvGrpSpPr>
         <p:grpSpPr>
           <a:xfrm>
-            <a:off x="5598385" y="1229042"/>
+            <a:off x="5050152" y="1499123"/>
             <a:ext cx="421217" cy="352147"/>
             <a:chOff x="5949236" y="1132976"/>
             <a:chExt cx="421217" cy="352147"/>
@@ -4606,11 +4393,11 @@
             <p:nvPr/>
           </p:nvPicPr>
           <p:blipFill>
-            <a:blip r:embed="rId15">
+            <a:blip r:embed="rId6">
               <a:extLst>
                 <a:ext uri="{BEBA8EAE-BF5A-486C-A8C5-ECC9F3942E4B}">
                   <a14:imgProps xmlns:a14="http://schemas.microsoft.com/office/drawing/2010/main">
-                    <a14:imgLayer r:embed="rId26">
+                    <a14:imgLayer r:embed="rId17">
                       <a14:imgEffect>
                         <a14:backgroundRemoval t="1778" b="96889" l="4000" r="93778">
                           <a14:foregroundMark x1="56444" y1="6667" x2="49333" y2="8889"/>
@@ -4679,7 +4466,7 @@
             <p:nvPr/>
           </p:nvPicPr>
           <p:blipFill>
-            <a:blip r:embed="rId27">
+            <a:blip r:embed="rId18">
               <a:extLst>
                 <a:ext uri="{28A0092B-C50C-407E-A947-70E740481C1C}">
                   <a14:useLocalDpi xmlns:a14="http://schemas.microsoft.com/office/drawing/2010/main" val="0"/>
@@ -4712,137 +4499,26 @@
           </p:spPr>
         </p:pic>
       </p:grpSp>
-      <p:sp>
-        <p:nvSpPr>
-          <p:cNvPr id="63" name="TextBox 62">
-            <a:extLst>
-              <a:ext uri="{FF2B5EF4-FFF2-40B4-BE49-F238E27FC236}">
-                <a16:creationId xmlns:a16="http://schemas.microsoft.com/office/drawing/2014/main" id="{AF690CA7-7C44-F14B-965B-A3EE7D97CB72}"/>
-              </a:ext>
-            </a:extLst>
-          </p:cNvPr>
-          <p:cNvSpPr txBox="1"/>
-          <p:nvPr/>
-        </p:nvSpPr>
-        <p:spPr>
-          <a:xfrm>
-            <a:off x="542913" y="5568456"/>
-            <a:ext cx="805774" cy="261610"/>
-          </a:xfrm>
-          <a:prstGeom prst="rect">
-            <a:avLst/>
-          </a:prstGeom>
-          <a:noFill/>
-        </p:spPr>
-        <p:txBody>
-          <a:bodyPr wrap="square" rtlCol="0">
-            <a:spAutoFit/>
-          </a:bodyPr>
-          <a:lstStyle/>
-          <a:p>
-            <a:pPr algn="ctr"/>
-            <a:r>
-              <a:rPr lang="en-US" sz="1100" dirty="0"/>
-              <a:t>IoT Device</a:t>
-            </a:r>
-            <a:endParaRPr lang="en-TH" sz="1100" dirty="0"/>
-          </a:p>
-        </p:txBody>
-      </p:sp>
-      <p:sp>
-        <p:nvSpPr>
-          <p:cNvPr id="65" name="TextBox 64">
-            <a:extLst>
-              <a:ext uri="{FF2B5EF4-FFF2-40B4-BE49-F238E27FC236}">
-                <a16:creationId xmlns:a16="http://schemas.microsoft.com/office/drawing/2014/main" id="{6756F3EE-09C2-C44B-8592-5C6012781CD6}"/>
-              </a:ext>
-            </a:extLst>
-          </p:cNvPr>
-          <p:cNvSpPr txBox="1"/>
-          <p:nvPr/>
-        </p:nvSpPr>
-        <p:spPr>
-          <a:xfrm>
-            <a:off x="1495620" y="5639691"/>
-            <a:ext cx="688629" cy="261610"/>
-          </a:xfrm>
-          <a:prstGeom prst="rect">
-            <a:avLst/>
-          </a:prstGeom>
-          <a:noFill/>
-        </p:spPr>
-        <p:txBody>
-          <a:bodyPr wrap="square" rtlCol="0">
-            <a:spAutoFit/>
-          </a:bodyPr>
-          <a:lstStyle/>
-          <a:p>
-            <a:r>
-              <a:rPr lang="en-US" sz="1100" dirty="0"/>
-              <a:t>IoT Edge</a:t>
-            </a:r>
-            <a:endParaRPr lang="en-TH" sz="1100" dirty="0"/>
-          </a:p>
-        </p:txBody>
-      </p:sp>
-      <p:sp>
-        <p:nvSpPr>
-          <p:cNvPr id="66" name="TextBox 65">
-            <a:extLst>
-              <a:ext uri="{FF2B5EF4-FFF2-40B4-BE49-F238E27FC236}">
-                <a16:creationId xmlns:a16="http://schemas.microsoft.com/office/drawing/2014/main" id="{CE2ACA18-B748-954C-8F24-58130CCD1D3D}"/>
-              </a:ext>
-            </a:extLst>
-          </p:cNvPr>
-          <p:cNvSpPr txBox="1"/>
-          <p:nvPr/>
-        </p:nvSpPr>
-        <p:spPr>
-          <a:xfrm>
-            <a:off x="1611388" y="4744077"/>
-            <a:ext cx="742523" cy="261610"/>
-          </a:xfrm>
-          <a:prstGeom prst="rect">
-            <a:avLst/>
-          </a:prstGeom>
-          <a:noFill/>
-        </p:spPr>
-        <p:txBody>
-          <a:bodyPr wrap="square" rtlCol="0">
-            <a:spAutoFit/>
-          </a:bodyPr>
-          <a:lstStyle/>
-          <a:p>
-            <a:r>
-              <a:rPr lang="en-US" sz="1100" dirty="0"/>
-              <a:t>IoT Hub</a:t>
-            </a:r>
-            <a:endParaRPr lang="en-TH" sz="1100" dirty="0"/>
-          </a:p>
-        </p:txBody>
-      </p:sp>
       <p:cxnSp>
         <p:nvCxnSpPr>
-          <p:cNvPr id="32" name="Elbow Connector 31">
-            <a:extLst>
-              <a:ext uri="{FF2B5EF4-FFF2-40B4-BE49-F238E27FC236}">
-                <a16:creationId xmlns:a16="http://schemas.microsoft.com/office/drawing/2014/main" id="{86673AB6-81A2-704C-8C08-791CAED0AC48}"/>
+          <p:cNvPr id="41" name="Straight Arrow Connector 40">
+            <a:extLst>
+              <a:ext uri="{FF2B5EF4-FFF2-40B4-BE49-F238E27FC236}">
+                <a16:creationId xmlns:a16="http://schemas.microsoft.com/office/drawing/2014/main" id="{6D43556F-9309-AF41-8D7C-700FE4D99133}"/>
               </a:ext>
             </a:extLst>
           </p:cNvPr>
           <p:cNvCxnSpPr>
             <a:cxnSpLocks/>
-            <a:stCxn id="35" idx="3"/>
-            <a:endCxn id="1036" idx="1"/>
           </p:cNvCxnSpPr>
           <p:nvPr/>
         </p:nvCxnSpPr>
         <p:spPr>
-          <a:xfrm>
-            <a:off x="1286921" y="5301048"/>
-            <a:ext cx="388709" cy="132354"/>
-          </a:xfrm>
-          <a:prstGeom prst="bentConnector3">
+          <a:xfrm flipV="1">
+            <a:off x="1181910" y="3702540"/>
+            <a:ext cx="0" cy="766042"/>
+          </a:xfrm>
+          <a:prstGeom prst="straightConnector1">
             <a:avLst/>
           </a:prstGeom>
           <a:ln>
@@ -4864,90 +4540,6 @@
           </a:fontRef>
         </p:style>
       </p:cxnSp>
-      <p:cxnSp>
-        <p:nvCxnSpPr>
-          <p:cNvPr id="39" name="Elbow Connector 38">
-            <a:extLst>
-              <a:ext uri="{FF2B5EF4-FFF2-40B4-BE49-F238E27FC236}">
-                <a16:creationId xmlns:a16="http://schemas.microsoft.com/office/drawing/2014/main" id="{EB2E9DEB-7CCE-374B-8EA2-06A2C5819D2F}"/>
-              </a:ext>
-            </a:extLst>
-          </p:cNvPr>
-          <p:cNvCxnSpPr>
-            <a:stCxn id="25" idx="0"/>
-            <a:endCxn id="11" idx="1"/>
-          </p:cNvCxnSpPr>
-          <p:nvPr/>
-        </p:nvCxnSpPr>
-        <p:spPr>
-          <a:xfrm rot="5400000" flipH="1" flipV="1">
-            <a:off x="1118208" y="4217811"/>
-            <a:ext cx="240833" cy="905429"/>
-          </a:xfrm>
-          <a:prstGeom prst="bentConnector2">
-            <a:avLst/>
-          </a:prstGeom>
-          <a:ln>
-            <a:tailEnd type="triangle"/>
-          </a:ln>
-        </p:spPr>
-        <p:style>
-          <a:lnRef idx="1">
-            <a:schemeClr val="dk1"/>
-          </a:lnRef>
-          <a:fillRef idx="0">
-            <a:schemeClr val="dk1"/>
-          </a:fillRef>
-          <a:effectRef idx="0">
-            <a:schemeClr val="dk1"/>
-          </a:effectRef>
-          <a:fontRef idx="minor">
-            <a:schemeClr val="tx1"/>
-          </a:fontRef>
-        </p:style>
-      </p:cxnSp>
-      <p:cxnSp>
-        <p:nvCxnSpPr>
-          <p:cNvPr id="41" name="Straight Arrow Connector 40">
-            <a:extLst>
-              <a:ext uri="{FF2B5EF4-FFF2-40B4-BE49-F238E27FC236}">
-                <a16:creationId xmlns:a16="http://schemas.microsoft.com/office/drawing/2014/main" id="{6D43556F-9309-AF41-8D7C-700FE4D99133}"/>
-              </a:ext>
-            </a:extLst>
-          </p:cNvPr>
-          <p:cNvCxnSpPr>
-            <a:cxnSpLocks/>
-            <a:stCxn id="11" idx="0"/>
-          </p:cNvCxnSpPr>
-          <p:nvPr/>
-        </p:nvCxnSpPr>
-        <p:spPr>
-          <a:xfrm flipV="1">
-            <a:off x="1888085" y="3379726"/>
-            <a:ext cx="0" cy="973636"/>
-          </a:xfrm>
-          <a:prstGeom prst="straightConnector1">
-            <a:avLst/>
-          </a:prstGeom>
-          <a:ln>
-            <a:tailEnd type="triangle"/>
-          </a:ln>
-        </p:spPr>
-        <p:style>
-          <a:lnRef idx="1">
-            <a:schemeClr val="dk1"/>
-          </a:lnRef>
-          <a:fillRef idx="0">
-            <a:schemeClr val="dk1"/>
-          </a:fillRef>
-          <a:effectRef idx="0">
-            <a:schemeClr val="dk1"/>
-          </a:effectRef>
-          <a:fontRef idx="minor">
-            <a:schemeClr val="tx1"/>
-          </a:fontRef>
-        </p:style>
-      </p:cxnSp>
       <p:sp>
         <p:nvSpPr>
           <p:cNvPr id="74" name="TextBox 73">
@@ -4962,7 +4554,7 @@
         </p:nvSpPr>
         <p:spPr>
           <a:xfrm>
-            <a:off x="2013672" y="4218278"/>
+            <a:off x="1002088" y="5026022"/>
             <a:ext cx="523475" cy="261610"/>
           </a:xfrm>
           <a:prstGeom prst="rect">
@@ -4997,7 +4589,7 @@
         </p:nvSpPr>
         <p:spPr>
           <a:xfrm>
-            <a:off x="1255627" y="3138593"/>
+            <a:off x="707394" y="3408674"/>
             <a:ext cx="959754" cy="261610"/>
           </a:xfrm>
           <a:prstGeom prst="rect">
@@ -5034,7 +4626,7 @@
         </p:nvSpPr>
         <p:spPr>
           <a:xfrm>
-            <a:off x="3233064" y="3121964"/>
+            <a:off x="2684831" y="3392045"/>
             <a:ext cx="959754" cy="261610"/>
           </a:xfrm>
           <a:prstGeom prst="rect">
@@ -5072,7 +4664,7 @@
           <p:nvPr/>
         </p:nvPicPr>
         <p:blipFill>
-          <a:blip r:embed="rId9">
+          <a:blip r:embed="rId4">
             <a:extLst>
               <a:ext uri="{28A0092B-C50C-407E-A947-70E740481C1C}">
                 <a14:useLocalDpi xmlns:a14="http://schemas.microsoft.com/office/drawing/2010/main" val="0"/>
@@ -5086,7 +4678,7 @@
         </p:blipFill>
         <p:spPr bwMode="auto">
           <a:xfrm flipH="1">
-            <a:off x="3454500" y="2690324"/>
+            <a:off x="2906267" y="2960405"/>
             <a:ext cx="490745" cy="490745"/>
           </a:xfrm>
           <a:prstGeom prst="rect">
@@ -5118,7 +4710,7 @@
         </p:nvSpPr>
         <p:spPr>
           <a:xfrm>
-            <a:off x="2055768" y="3112342"/>
+            <a:off x="1540699" y="3416258"/>
             <a:ext cx="1398612" cy="261610"/>
           </a:xfrm>
           <a:prstGeom prst="rect">
@@ -5134,10 +4726,9 @@
           <a:p>
             <a:pPr algn="ctr"/>
             <a:r>
-              <a:rPr lang="en-US" sz="1100" dirty="0" err="1"/>
-              <a:t>data_prep.ipynb</a:t>
-            </a:r>
-            <a:endParaRPr lang="en-TH" sz="1100" dirty="0"/>
+              <a:rPr lang="en-TH" sz="1100" dirty="0"/>
+              <a:t>Data Prep Script</a:t>
+            </a:r>
           </a:p>
         </p:txBody>
       </p:sp>
@@ -5156,10 +4747,10 @@
           <p:nvPr/>
         </p:nvPicPr>
         <p:blipFill>
-          <a:blip r:embed="rId28">
+          <a:blip r:embed="rId19">
             <a:extLst>
               <a:ext uri="{96DAC541-7B7A-43D3-8B79-37D633B846F1}">
-                <asvg:svgBlip xmlns:asvg="http://schemas.microsoft.com/office/drawing/2016/SVG/main" r:embed="rId29"/>
+                <asvg:svgBlip xmlns:asvg="http://schemas.microsoft.com/office/drawing/2016/SVG/main" r:embed="rId20"/>
               </a:ext>
             </a:extLst>
           </a:blip>
@@ -5169,8 +4760,8 @@
         </p:blipFill>
         <p:spPr>
           <a:xfrm>
-            <a:off x="8306317" y="2508823"/>
-            <a:ext cx="453443" cy="453443"/>
+            <a:off x="7302763" y="2677333"/>
+            <a:ext cx="534495" cy="534495"/>
           </a:xfrm>
           <a:prstGeom prst="rect">
             <a:avLst/>
@@ -5191,7 +4782,7 @@
         </p:nvGrpSpPr>
         <p:grpSpPr>
           <a:xfrm>
-            <a:off x="6187508" y="3483150"/>
+            <a:off x="5639275" y="3753231"/>
             <a:ext cx="421217" cy="352147"/>
             <a:chOff x="5949236" y="1132976"/>
             <a:chExt cx="421217" cy="352147"/>
@@ -5212,11 +4803,11 @@
             <p:nvPr/>
           </p:nvPicPr>
           <p:blipFill>
-            <a:blip r:embed="rId15">
+            <a:blip r:embed="rId6">
               <a:extLst>
                 <a:ext uri="{BEBA8EAE-BF5A-486C-A8C5-ECC9F3942E4B}">
                   <a14:imgProps xmlns:a14="http://schemas.microsoft.com/office/drawing/2010/main">
-                    <a14:imgLayer r:embed="rId26">
+                    <a14:imgLayer r:embed="rId17">
                       <a14:imgEffect>
                         <a14:backgroundRemoval t="1778" b="96889" l="4000" r="93778">
                           <a14:foregroundMark x1="56444" y1="6667" x2="49333" y2="8889"/>
@@ -5285,7 +4876,7 @@
             <p:nvPr/>
           </p:nvPicPr>
           <p:blipFill>
-            <a:blip r:embed="rId27">
+            <a:blip r:embed="rId18">
               <a:extLst>
                 <a:ext uri="{28A0092B-C50C-407E-A947-70E740481C1C}">
                   <a14:useLocalDpi xmlns:a14="http://schemas.microsoft.com/office/drawing/2010/main" val="0"/>
@@ -5318,59 +4909,56 @@
           </p:spPr>
         </p:pic>
       </p:grpSp>
-      <p:pic>
-        <p:nvPicPr>
-          <p:cNvPr id="1068" name="Picture 44" descr="Azure Container Registry-icon | Brands AP - AZ">
-            <a:extLst>
-              <a:ext uri="{FF2B5EF4-FFF2-40B4-BE49-F238E27FC236}">
-                <a16:creationId xmlns:a16="http://schemas.microsoft.com/office/drawing/2014/main" id="{C28EE840-6D5B-574B-8845-ED9E590A5805}"/>
-              </a:ext>
-            </a:extLst>
-          </p:cNvPr>
-          <p:cNvPicPr>
-            <a:picLocks noChangeAspect="1" noChangeArrowheads="1"/>
-          </p:cNvPicPr>
+      <p:sp>
+        <p:nvSpPr>
+          <p:cNvPr id="86" name="TextBox 85">
+            <a:extLst>
+              <a:ext uri="{FF2B5EF4-FFF2-40B4-BE49-F238E27FC236}">
+                <a16:creationId xmlns:a16="http://schemas.microsoft.com/office/drawing/2014/main" id="{A42DA294-43B6-2649-87B9-47283E994218}"/>
+              </a:ext>
+            </a:extLst>
+          </p:cNvPr>
+          <p:cNvSpPr txBox="1"/>
           <p:nvPr/>
-        </p:nvPicPr>
-        <p:blipFill>
-          <a:blip r:embed="rId30">
-            <a:extLst>
-              <a:ext uri="{28A0092B-C50C-407E-A947-70E740481C1C}">
-                <a14:useLocalDpi xmlns:a14="http://schemas.microsoft.com/office/drawing/2010/main" val="0"/>
-              </a:ext>
-            </a:extLst>
-          </a:blip>
-          <a:srcRect/>
-          <a:stretch>
-            <a:fillRect/>
-          </a:stretch>
-        </p:blipFill>
-        <p:spPr bwMode="auto">
-          <a:xfrm>
-            <a:off x="8357352" y="1515876"/>
-            <a:ext cx="408964" cy="346949"/>
+        </p:nvSpPr>
+        <p:spPr>
+          <a:xfrm>
+            <a:off x="7037919" y="3194599"/>
+            <a:ext cx="1029199" cy="430887"/>
           </a:xfrm>
           <a:prstGeom prst="rect">
             <a:avLst/>
           </a:prstGeom>
           <a:noFill/>
-          <a:extLst>
-            <a:ext uri="{909E8E84-426E-40DD-AFC4-6F175D3DCCD1}">
-              <a14:hiddenFill xmlns:a14="http://schemas.microsoft.com/office/drawing/2010/main">
-                <a:solidFill>
-                  <a:srgbClr val="FFFFFF"/>
-                </a:solidFill>
-              </a14:hiddenFill>
-            </a:ext>
-          </a:extLst>
-        </p:spPr>
-      </p:pic>
-      <p:sp>
-        <p:nvSpPr>
-          <p:cNvPr id="86" name="TextBox 85">
-            <a:extLst>
-              <a:ext uri="{FF2B5EF4-FFF2-40B4-BE49-F238E27FC236}">
-                <a16:creationId xmlns:a16="http://schemas.microsoft.com/office/drawing/2014/main" id="{A42DA294-43B6-2649-87B9-47283E994218}"/>
+        </p:spPr>
+        <p:txBody>
+          <a:bodyPr wrap="square" rtlCol="0">
+            <a:spAutoFit/>
+          </a:bodyPr>
+          <a:lstStyle/>
+          <a:p>
+            <a:pPr algn="ctr"/>
+            <a:r>
+              <a:rPr lang="en-US" sz="1100" dirty="0"/>
+              <a:t>Performance</a:t>
+            </a:r>
+          </a:p>
+          <a:p>
+            <a:pPr algn="ctr"/>
+            <a:r>
+              <a:rPr lang="en-US" sz="1100" dirty="0"/>
+              <a:t>Benchmarking</a:t>
+            </a:r>
+            <a:endParaRPr lang="en-TH" sz="1100" dirty="0"/>
+          </a:p>
+        </p:txBody>
+      </p:sp>
+      <p:sp>
+        <p:nvSpPr>
+          <p:cNvPr id="87" name="TextBox 86">
+            <a:extLst>
+              <a:ext uri="{FF2B5EF4-FFF2-40B4-BE49-F238E27FC236}">
+                <a16:creationId xmlns:a16="http://schemas.microsoft.com/office/drawing/2014/main" id="{65C227D9-0A61-5C44-A671-BFFA4ED62B49}"/>
               </a:ext>
             </a:extLst>
           </p:cNvPr>
@@ -5379,8 +4967,8 @@
         </p:nvSpPr>
         <p:spPr>
           <a:xfrm>
-            <a:off x="7987993" y="2915212"/>
-            <a:ext cx="1029199" cy="261610"/>
+            <a:off x="5749845" y="3187959"/>
+            <a:ext cx="1316085" cy="430887"/>
           </a:xfrm>
           <a:prstGeom prst="rect">
             <a:avLst/>
@@ -5393,210 +4981,23 @@
           </a:bodyPr>
           <a:lstStyle/>
           <a:p>
-            <a:r>
-              <a:rPr lang="en-US" sz="1100" dirty="0"/>
-              <a:t>Benchmarking</a:t>
-            </a:r>
-            <a:endParaRPr lang="en-TH" sz="1100" dirty="0"/>
-          </a:p>
-        </p:txBody>
-      </p:sp>
-      <p:sp>
-        <p:nvSpPr>
-          <p:cNvPr id="87" name="TextBox 86">
-            <a:extLst>
-              <a:ext uri="{FF2B5EF4-FFF2-40B4-BE49-F238E27FC236}">
-                <a16:creationId xmlns:a16="http://schemas.microsoft.com/office/drawing/2014/main" id="{65C227D9-0A61-5C44-A671-BFFA4ED62B49}"/>
-              </a:ext>
-            </a:extLst>
-          </p:cNvPr>
-          <p:cNvSpPr txBox="1"/>
-          <p:nvPr/>
-        </p:nvSpPr>
-        <p:spPr>
-          <a:xfrm>
-            <a:off x="6512115" y="2953128"/>
-            <a:ext cx="926090" cy="261610"/>
-          </a:xfrm>
-          <a:prstGeom prst="rect">
-            <a:avLst/>
-          </a:prstGeom>
-          <a:noFill/>
-        </p:spPr>
-        <p:txBody>
-          <a:bodyPr wrap="square" rtlCol="0">
-            <a:spAutoFit/>
-          </a:bodyPr>
-          <a:lstStyle/>
-          <a:p>
+            <a:pPr algn="ctr"/>
             <a:r>
               <a:rPr lang="en-US" sz="1100" dirty="0"/>
               <a:t>AML Pipeline</a:t>
             </a:r>
+            <a:endParaRPr lang="th-TH" sz="1100" dirty="0"/>
+          </a:p>
+          <a:p>
+            <a:pPr algn="ctr"/>
+            <a:r>
+              <a:rPr lang="en-US" sz="1100" dirty="0"/>
+              <a:t>(Model Register)</a:t>
+            </a:r>
             <a:endParaRPr lang="en-TH" sz="1100" dirty="0"/>
           </a:p>
         </p:txBody>
       </p:sp>
-      <p:grpSp>
-        <p:nvGrpSpPr>
-          <p:cNvPr id="89" name="Group 88">
-            <a:extLst>
-              <a:ext uri="{FF2B5EF4-FFF2-40B4-BE49-F238E27FC236}">
-                <a16:creationId xmlns:a16="http://schemas.microsoft.com/office/drawing/2014/main" id="{3D6D48C4-B884-7E4E-BF0F-078EC59B4388}"/>
-              </a:ext>
-            </a:extLst>
-          </p:cNvPr>
-          <p:cNvGrpSpPr/>
-          <p:nvPr/>
-        </p:nvGrpSpPr>
-        <p:grpSpPr>
-          <a:xfrm>
-            <a:off x="7290222" y="4058282"/>
-            <a:ext cx="458121" cy="394245"/>
-            <a:chOff x="3627237" y="2135301"/>
-            <a:chExt cx="662265" cy="569925"/>
-          </a:xfrm>
-        </p:grpSpPr>
-        <p:pic>
-          <p:nvPicPr>
-            <p:cNvPr id="90" name="Picture 28" descr="Azureml Tensorflow 2.4 Inference GPU Image by Microsoft | Docker Hub">
-              <a:extLst>
-                <a:ext uri="{FF2B5EF4-FFF2-40B4-BE49-F238E27FC236}">
-                  <a16:creationId xmlns:a16="http://schemas.microsoft.com/office/drawing/2014/main" id="{8D91A542-A64D-DB48-B546-1E30E9F6226E}"/>
-                </a:ext>
-              </a:extLst>
-            </p:cNvPr>
-            <p:cNvPicPr>
-              <a:picLocks noChangeAspect="1" noChangeArrowheads="1"/>
-            </p:cNvPicPr>
-            <p:nvPr/>
-          </p:nvPicPr>
-          <p:blipFill>
-            <a:blip r:embed="rId15">
-              <a:extLst>
-                <a:ext uri="{BEBA8EAE-BF5A-486C-A8C5-ECC9F3942E4B}">
-                  <a14:imgProps xmlns:a14="http://schemas.microsoft.com/office/drawing/2010/main">
-                    <a14:imgLayer r:embed="rId26">
-                      <a14:imgEffect>
-                        <a14:backgroundRemoval t="1778" b="96889" l="4000" r="93778">
-                          <a14:foregroundMark x1="56444" y1="6667" x2="49333" y2="8889"/>
-                          <a14:foregroundMark x1="48000" y1="2222" x2="53778" y2="3111"/>
-                          <a14:foregroundMark x1="6222" y1="76889" x2="10222" y2="93333"/>
-                          <a14:foregroundMark x1="10222" y1="93333" x2="13778" y2="97333"/>
-                          <a14:foregroundMark x1="4444" y1="78222" x2="4889" y2="80000"/>
-                          <a14:foregroundMark x1="74222" y1="68889" x2="81333" y2="84889"/>
-                          <a14:foregroundMark x1="81333" y1="84889" x2="43111" y2="88889"/>
-                          <a14:foregroundMark x1="28889" y1="86667" x2="58222" y2="88889"/>
-                          <a14:foregroundMark x1="58222" y1="88889" x2="75111" y2="87556"/>
-                          <a14:foregroundMark x1="75111" y1="87556" x2="75111" y2="87556"/>
-                          <a14:foregroundMark x1="25333" y1="88000" x2="58222" y2="95111"/>
-                          <a14:foregroundMark x1="58222" y1="95111" x2="66222" y2="93778"/>
-                          <a14:foregroundMark x1="19556" y1="92889" x2="47556" y2="93778"/>
-                          <a14:foregroundMark x1="47556" y1="93778" x2="71556" y2="90667"/>
-                          <a14:foregroundMark x1="71556" y1="90667" x2="73333" y2="89333"/>
-                          <a14:foregroundMark x1="93778" y1="78667" x2="92000" y2="80889"/>
-                        </a14:backgroundRemoval>
-                      </a14:imgEffect>
-                    </a14:imgLayer>
-                  </a14:imgProps>
-                </a:ext>
-                <a:ext uri="{28A0092B-C50C-407E-A947-70E740481C1C}">
-                  <a14:useLocalDpi xmlns:a14="http://schemas.microsoft.com/office/drawing/2010/main" val="0"/>
-                </a:ext>
-              </a:extLst>
-            </a:blip>
-            <a:srcRect/>
-            <a:stretch>
-              <a:fillRect/>
-            </a:stretch>
-          </p:blipFill>
-          <p:spPr bwMode="auto">
-            <a:xfrm>
-              <a:off x="3627237" y="2135301"/>
-              <a:ext cx="481282" cy="481282"/>
-            </a:xfrm>
-            <a:prstGeom prst="rect">
-              <a:avLst/>
-            </a:prstGeom>
-            <a:noFill/>
-            <a:extLst>
-              <a:ext uri="{909E8E84-426E-40DD-AFC4-6F175D3DCCD1}">
-                <a14:hiddenFill xmlns:a14="http://schemas.microsoft.com/office/drawing/2010/main">
-                  <a:solidFill>
-                    <a:srgbClr val="FFFFFF"/>
-                  </a:solidFill>
-                </a14:hiddenFill>
-              </a:ext>
-            </a:extLst>
-          </p:spPr>
-        </p:pic>
-        <p:pic>
-          <p:nvPicPr>
-            <p:cNvPr id="91" name="Picture 26" descr="Data Services - SQL Database (US Gov AZ) / Prem PRS6 DB Days | TW Micronics">
-              <a:extLst>
-                <a:ext uri="{FF2B5EF4-FFF2-40B4-BE49-F238E27FC236}">
-                  <a16:creationId xmlns:a16="http://schemas.microsoft.com/office/drawing/2014/main" id="{8358C240-89DA-6B4C-BA99-CA5DAA264E20}"/>
-                </a:ext>
-              </a:extLst>
-            </p:cNvPr>
-            <p:cNvPicPr>
-              <a:picLocks noChangeAspect="1" noChangeArrowheads="1"/>
-            </p:cNvPicPr>
-            <p:nvPr/>
-          </p:nvPicPr>
-          <p:blipFill rotWithShape="1">
-            <a:blip r:embed="rId17">
-              <a:extLst>
-                <a:ext uri="{BEBA8EAE-BF5A-486C-A8C5-ECC9F3942E4B}">
-                  <a14:imgProps xmlns:a14="http://schemas.microsoft.com/office/drawing/2010/main">
-                    <a14:imgLayer r:embed="rId31">
-                      <a14:imgEffect>
-                        <a14:backgroundRemoval t="36000" b="64667" l="69167" r="99167">
-                          <a14:foregroundMark x1="69583" y1="45333" x2="69583" y2="58667"/>
-                          <a14:foregroundMark x1="95000" y1="43333" x2="94583" y2="57333"/>
-                          <a14:foregroundMark x1="94583" y1="57333" x2="94167" y2="58667"/>
-                          <a14:foregroundMark x1="97500" y1="44667" x2="97500" y2="55333"/>
-                          <a14:foregroundMark x1="97500" y1="45333" x2="97500" y2="53333"/>
-                          <a14:foregroundMark x1="97500" y1="45333" x2="97917" y2="55333"/>
-                          <a14:foregroundMark x1="98333" y1="46667" x2="98750" y2="56667"/>
-                          <a14:foregroundMark x1="98333" y1="44667" x2="98750" y2="55333"/>
-                          <a14:foregroundMark x1="99167" y1="46000" x2="99167" y2="57333"/>
-                          <a14:foregroundMark x1="72083" y1="54000" x2="71667" y2="53333"/>
-                          <a14:foregroundMark x1="71250" y1="52667" x2="71250" y2="56000"/>
-                        </a14:backgroundRemoval>
-                      </a14:imgEffect>
-                    </a14:imgLayer>
-                  </a14:imgProps>
-                </a:ext>
-                <a:ext uri="{28A0092B-C50C-407E-A947-70E740481C1C}">
-                  <a14:useLocalDpi xmlns:a14="http://schemas.microsoft.com/office/drawing/2010/main" val="0"/>
-                </a:ext>
-              </a:extLst>
-            </a:blip>
-            <a:srcRect l="66254" t="32470" b="31357"/>
-            <a:stretch/>
-          </p:blipFill>
-          <p:spPr bwMode="auto">
-            <a:xfrm>
-              <a:off x="3849422" y="2410401"/>
-              <a:ext cx="440080" cy="294825"/>
-            </a:xfrm>
-            <a:prstGeom prst="rect">
-              <a:avLst/>
-            </a:prstGeom>
-            <a:noFill/>
-            <a:extLst>
-              <a:ext uri="{909E8E84-426E-40DD-AFC4-6F175D3DCCD1}">
-                <a14:hiddenFill xmlns:a14="http://schemas.microsoft.com/office/drawing/2010/main">
-                  <a:solidFill>
-                    <a:srgbClr val="FFFFFF"/>
-                  </a:solidFill>
-                </a14:hiddenFill>
-              </a:ext>
-            </a:extLst>
-          </p:spPr>
-        </p:pic>
-      </p:grpSp>
       <p:cxnSp>
         <p:nvCxnSpPr>
           <p:cNvPr id="45" name="Elbow Connector 44">
@@ -5615,7 +5016,7 @@
         </p:nvCxnSpPr>
         <p:spPr>
           <a:xfrm flipV="1">
-            <a:off x="4180882" y="1832956"/>
+            <a:off x="3632649" y="2103037"/>
             <a:ext cx="423038" cy="1196472"/>
           </a:xfrm>
           <a:prstGeom prst="bentConnector3">
@@ -5658,13 +5059,1202 @@
         </p:nvCxnSpPr>
         <p:spPr>
           <a:xfrm>
-            <a:off x="4180882" y="3029428"/>
+            <a:off x="3632649" y="3299509"/>
             <a:ext cx="365732" cy="1387460"/>
           </a:xfrm>
           <a:prstGeom prst="bentConnector3">
             <a:avLst>
               <a:gd name="adj1" fmla="val 58131"/>
             </a:avLst>
+          </a:prstGeom>
+          <a:ln>
+            <a:tailEnd type="triangle"/>
+          </a:ln>
+        </p:spPr>
+        <p:style>
+          <a:lnRef idx="1">
+            <a:schemeClr val="dk1"/>
+          </a:lnRef>
+          <a:fillRef idx="0">
+            <a:schemeClr val="dk1"/>
+          </a:fillRef>
+          <a:effectRef idx="0">
+            <a:schemeClr val="dk1"/>
+          </a:effectRef>
+          <a:fontRef idx="minor">
+            <a:schemeClr val="tx1"/>
+          </a:fontRef>
+        </p:style>
+      </p:cxnSp>
+      <p:cxnSp>
+        <p:nvCxnSpPr>
+          <p:cNvPr id="5" name="Elbow Connector 4">
+            <a:extLst>
+              <a:ext uri="{FF2B5EF4-FFF2-40B4-BE49-F238E27FC236}">
+                <a16:creationId xmlns:a16="http://schemas.microsoft.com/office/drawing/2014/main" id="{24F3833D-5F9E-194D-89EF-47FFF3C09990}"/>
+              </a:ext>
+            </a:extLst>
+          </p:cNvPr>
+          <p:cNvCxnSpPr>
+            <a:stCxn id="55" idx="3"/>
+            <a:endCxn id="1058" idx="0"/>
+          </p:cNvCxnSpPr>
+          <p:nvPr/>
+        </p:nvCxnSpPr>
+        <p:spPr>
+          <a:xfrm>
+            <a:off x="5300499" y="2103037"/>
+            <a:ext cx="1109504" cy="574296"/>
+          </a:xfrm>
+          <a:prstGeom prst="bentConnector2">
+            <a:avLst/>
+          </a:prstGeom>
+          <a:ln>
+            <a:tailEnd type="triangle"/>
+          </a:ln>
+        </p:spPr>
+        <p:style>
+          <a:lnRef idx="1">
+            <a:schemeClr val="dk1"/>
+          </a:lnRef>
+          <a:fillRef idx="0">
+            <a:schemeClr val="dk1"/>
+          </a:fillRef>
+          <a:effectRef idx="0">
+            <a:schemeClr val="dk1"/>
+          </a:effectRef>
+          <a:fontRef idx="minor">
+            <a:schemeClr val="tx1"/>
+          </a:fontRef>
+        </p:style>
+      </p:cxnSp>
+      <p:cxnSp>
+        <p:nvCxnSpPr>
+          <p:cNvPr id="7" name="Elbow Connector 6">
+            <a:extLst>
+              <a:ext uri="{FF2B5EF4-FFF2-40B4-BE49-F238E27FC236}">
+                <a16:creationId xmlns:a16="http://schemas.microsoft.com/office/drawing/2014/main" id="{257CDAFF-2666-3244-857D-A94695EFD2C9}"/>
+              </a:ext>
+            </a:extLst>
+          </p:cNvPr>
+          <p:cNvCxnSpPr>
+            <a:cxnSpLocks/>
+            <a:stCxn id="56" idx="3"/>
+            <a:endCxn id="87" idx="2"/>
+          </p:cNvCxnSpPr>
+          <p:nvPr/>
+        </p:nvCxnSpPr>
+        <p:spPr>
+          <a:xfrm flipV="1">
+            <a:off x="5882863" y="3618846"/>
+            <a:ext cx="525025" cy="1068123"/>
+          </a:xfrm>
+          <a:prstGeom prst="bentConnector2">
+            <a:avLst/>
+          </a:prstGeom>
+          <a:ln>
+            <a:tailEnd type="triangle"/>
+          </a:ln>
+        </p:spPr>
+        <p:style>
+          <a:lnRef idx="1">
+            <a:schemeClr val="dk1"/>
+          </a:lnRef>
+          <a:fillRef idx="0">
+            <a:schemeClr val="dk1"/>
+          </a:fillRef>
+          <a:effectRef idx="0">
+            <a:schemeClr val="dk1"/>
+          </a:effectRef>
+          <a:fontRef idx="minor">
+            <a:schemeClr val="tx1"/>
+          </a:fontRef>
+        </p:style>
+      </p:cxnSp>
+      <p:cxnSp>
+        <p:nvCxnSpPr>
+          <p:cNvPr id="13" name="Straight Arrow Connector 12">
+            <a:extLst>
+              <a:ext uri="{FF2B5EF4-FFF2-40B4-BE49-F238E27FC236}">
+                <a16:creationId xmlns:a16="http://schemas.microsoft.com/office/drawing/2014/main" id="{271EFB81-64ED-B547-B98A-DE8B0B690BD0}"/>
+              </a:ext>
+            </a:extLst>
+          </p:cNvPr>
+          <p:cNvCxnSpPr>
+            <a:cxnSpLocks/>
+          </p:cNvCxnSpPr>
+          <p:nvPr/>
+        </p:nvCxnSpPr>
+        <p:spPr>
+          <a:xfrm>
+            <a:off x="6687016" y="3055609"/>
+            <a:ext cx="430044" cy="0"/>
+          </a:xfrm>
+          <a:prstGeom prst="straightConnector1">
+            <a:avLst/>
+          </a:prstGeom>
+          <a:ln>
+            <a:tailEnd type="triangle"/>
+          </a:ln>
+        </p:spPr>
+        <p:style>
+          <a:lnRef idx="1">
+            <a:schemeClr val="dk1"/>
+          </a:lnRef>
+          <a:fillRef idx="0">
+            <a:schemeClr val="dk1"/>
+          </a:fillRef>
+          <a:effectRef idx="0">
+            <a:schemeClr val="dk1"/>
+          </a:effectRef>
+          <a:fontRef idx="minor">
+            <a:schemeClr val="tx1"/>
+          </a:fontRef>
+        </p:style>
+      </p:cxnSp>
+      <p:sp>
+        <p:nvSpPr>
+          <p:cNvPr id="67" name="TextBox 66">
+            <a:extLst>
+              <a:ext uri="{FF2B5EF4-FFF2-40B4-BE49-F238E27FC236}">
+                <a16:creationId xmlns:a16="http://schemas.microsoft.com/office/drawing/2014/main" id="{4E5F9B92-21DE-0C4B-B973-23B04A3FBAA0}"/>
+              </a:ext>
+            </a:extLst>
+          </p:cNvPr>
+          <p:cNvSpPr txBox="1"/>
+          <p:nvPr/>
+        </p:nvSpPr>
+        <p:spPr>
+          <a:xfrm>
+            <a:off x="420752" y="5332378"/>
+            <a:ext cx="1722798" cy="338554"/>
+          </a:xfrm>
+          <a:prstGeom prst="rect">
+            <a:avLst/>
+          </a:prstGeom>
+          <a:noFill/>
+        </p:spPr>
+        <p:txBody>
+          <a:bodyPr wrap="square" rtlCol="0">
+            <a:spAutoFit/>
+          </a:bodyPr>
+          <a:lstStyle/>
+          <a:p>
+            <a:pPr algn="ctr"/>
+            <a:r>
+              <a:rPr lang="en-US" sz="1600" b="1" u="sng" dirty="0"/>
+              <a:t>1.) Data Registry</a:t>
+            </a:r>
+          </a:p>
+        </p:txBody>
+      </p:sp>
+      <p:sp>
+        <p:nvSpPr>
+          <p:cNvPr id="68" name="TextBox 67">
+            <a:extLst>
+              <a:ext uri="{FF2B5EF4-FFF2-40B4-BE49-F238E27FC236}">
+                <a16:creationId xmlns:a16="http://schemas.microsoft.com/office/drawing/2014/main" id="{C465B349-9179-AB41-9FF7-23E622027CF4}"/>
+              </a:ext>
+            </a:extLst>
+          </p:cNvPr>
+          <p:cNvSpPr txBox="1"/>
+          <p:nvPr/>
+        </p:nvSpPr>
+        <p:spPr>
+          <a:xfrm>
+            <a:off x="536480" y="2504947"/>
+            <a:ext cx="2269449" cy="338554"/>
+          </a:xfrm>
+          <a:prstGeom prst="rect">
+            <a:avLst/>
+          </a:prstGeom>
+          <a:noFill/>
+        </p:spPr>
+        <p:txBody>
+          <a:bodyPr wrap="square" rtlCol="0">
+            <a:spAutoFit/>
+          </a:bodyPr>
+          <a:lstStyle/>
+          <a:p>
+            <a:pPr algn="ctr"/>
+            <a:r>
+              <a:rPr lang="en-US" sz="1600" b="1" u="sng" dirty="0"/>
+              <a:t>2.) Data Preprocessing</a:t>
+            </a:r>
+            <a:endParaRPr lang="th-TH" sz="1600" b="1" u="sng" dirty="0"/>
+          </a:p>
+        </p:txBody>
+      </p:sp>
+      <p:sp>
+        <p:nvSpPr>
+          <p:cNvPr id="69" name="TextBox 68">
+            <a:extLst>
+              <a:ext uri="{FF2B5EF4-FFF2-40B4-BE49-F238E27FC236}">
+                <a16:creationId xmlns:a16="http://schemas.microsoft.com/office/drawing/2014/main" id="{FCB083D8-D723-B84F-B37A-3BD2BB627541}"/>
+              </a:ext>
+            </a:extLst>
+          </p:cNvPr>
+          <p:cNvSpPr txBox="1"/>
+          <p:nvPr/>
+        </p:nvSpPr>
+        <p:spPr>
+          <a:xfrm>
+            <a:off x="3517467" y="1205880"/>
+            <a:ext cx="2678869" cy="338554"/>
+          </a:xfrm>
+          <a:prstGeom prst="rect">
+            <a:avLst/>
+          </a:prstGeom>
+          <a:noFill/>
+        </p:spPr>
+        <p:txBody>
+          <a:bodyPr wrap="square" rtlCol="0">
+            <a:spAutoFit/>
+          </a:bodyPr>
+          <a:lstStyle/>
+          <a:p>
+            <a:pPr algn="ctr"/>
+            <a:r>
+              <a:rPr lang="en-US" sz="1600" b="1" u="sng" dirty="0"/>
+              <a:t>3.1 ) Automated ML Model</a:t>
+            </a:r>
+            <a:endParaRPr lang="th-TH" sz="1600" b="1" u="sng" dirty="0"/>
+          </a:p>
+        </p:txBody>
+      </p:sp>
+      <p:sp>
+        <p:nvSpPr>
+          <p:cNvPr id="70" name="TextBox 69">
+            <a:extLst>
+              <a:ext uri="{FF2B5EF4-FFF2-40B4-BE49-F238E27FC236}">
+                <a16:creationId xmlns:a16="http://schemas.microsoft.com/office/drawing/2014/main" id="{3018FEFF-E274-3342-960E-79D4CA4BF556}"/>
+              </a:ext>
+            </a:extLst>
+          </p:cNvPr>
+          <p:cNvSpPr txBox="1"/>
+          <p:nvPr/>
+        </p:nvSpPr>
+        <p:spPr>
+          <a:xfrm>
+            <a:off x="3145382" y="5539640"/>
+            <a:ext cx="3662609" cy="338554"/>
+          </a:xfrm>
+          <a:prstGeom prst="rect">
+            <a:avLst/>
+          </a:prstGeom>
+          <a:noFill/>
+        </p:spPr>
+        <p:txBody>
+          <a:bodyPr wrap="square" rtlCol="0">
+            <a:spAutoFit/>
+          </a:bodyPr>
+          <a:lstStyle/>
+          <a:p>
+            <a:pPr algn="ctr"/>
+            <a:r>
+              <a:rPr lang="en-US" sz="1600" b="1" u="sng" dirty="0"/>
+              <a:t>3.2 )LGBM Classifier with Hyperdrive</a:t>
+            </a:r>
+            <a:endParaRPr lang="th-TH" sz="1600" b="1" u="sng" dirty="0"/>
+          </a:p>
+        </p:txBody>
+      </p:sp>
+      <p:sp>
+        <p:nvSpPr>
+          <p:cNvPr id="78" name="TextBox 77">
+            <a:extLst>
+              <a:ext uri="{FF2B5EF4-FFF2-40B4-BE49-F238E27FC236}">
+                <a16:creationId xmlns:a16="http://schemas.microsoft.com/office/drawing/2014/main" id="{FC2BA823-0D1A-3247-9F25-80E3FFF2B8F3}"/>
+              </a:ext>
+            </a:extLst>
+          </p:cNvPr>
+          <p:cNvSpPr txBox="1"/>
+          <p:nvPr/>
+        </p:nvSpPr>
+        <p:spPr>
+          <a:xfrm>
+            <a:off x="8414966" y="3290410"/>
+            <a:ext cx="1198321" cy="430887"/>
+          </a:xfrm>
+          <a:prstGeom prst="rect">
+            <a:avLst/>
+          </a:prstGeom>
+          <a:noFill/>
+        </p:spPr>
+        <p:txBody>
+          <a:bodyPr wrap="square" rtlCol="0">
+            <a:spAutoFit/>
+          </a:bodyPr>
+          <a:lstStyle/>
+          <a:p>
+            <a:pPr algn="ctr"/>
+            <a:r>
+              <a:rPr lang="en-TH" sz="1100" dirty="0"/>
+              <a:t>Azure Container Instance</a:t>
+            </a:r>
+          </a:p>
+        </p:txBody>
+      </p:sp>
+      <p:sp>
+        <p:nvSpPr>
+          <p:cNvPr id="85" name="TextBox 84">
+            <a:extLst>
+              <a:ext uri="{FF2B5EF4-FFF2-40B4-BE49-F238E27FC236}">
+                <a16:creationId xmlns:a16="http://schemas.microsoft.com/office/drawing/2014/main" id="{8C88E94E-115F-B245-9984-68247FF7500D}"/>
+              </a:ext>
+            </a:extLst>
+          </p:cNvPr>
+          <p:cNvSpPr txBox="1"/>
+          <p:nvPr/>
+        </p:nvSpPr>
+        <p:spPr>
+          <a:xfrm>
+            <a:off x="9844445" y="3256558"/>
+            <a:ext cx="897435" cy="430887"/>
+          </a:xfrm>
+          <a:prstGeom prst="rect">
+            <a:avLst/>
+          </a:prstGeom>
+          <a:noFill/>
+        </p:spPr>
+        <p:txBody>
+          <a:bodyPr wrap="square" rtlCol="0">
+            <a:spAutoFit/>
+          </a:bodyPr>
+          <a:lstStyle/>
+          <a:p>
+            <a:pPr algn="ctr"/>
+            <a:r>
+              <a:rPr lang="en-TH" sz="1100" dirty="0"/>
+              <a:t>Azure Web Service</a:t>
+            </a:r>
+          </a:p>
+        </p:txBody>
+      </p:sp>
+      <p:cxnSp>
+        <p:nvCxnSpPr>
+          <p:cNvPr id="88" name="Straight Arrow Connector 87">
+            <a:extLst>
+              <a:ext uri="{FF2B5EF4-FFF2-40B4-BE49-F238E27FC236}">
+                <a16:creationId xmlns:a16="http://schemas.microsoft.com/office/drawing/2014/main" id="{0DE4C084-8F20-924D-ADB0-1D52BD8C867D}"/>
+              </a:ext>
+            </a:extLst>
+          </p:cNvPr>
+          <p:cNvCxnSpPr>
+            <a:cxnSpLocks/>
+          </p:cNvCxnSpPr>
+          <p:nvPr/>
+        </p:nvCxnSpPr>
+        <p:spPr>
+          <a:xfrm>
+            <a:off x="7852096" y="3070566"/>
+            <a:ext cx="703521" cy="0"/>
+          </a:xfrm>
+          <a:prstGeom prst="straightConnector1">
+            <a:avLst/>
+          </a:prstGeom>
+          <a:ln>
+            <a:tailEnd type="triangle"/>
+          </a:ln>
+        </p:spPr>
+        <p:style>
+          <a:lnRef idx="1">
+            <a:schemeClr val="dk1"/>
+          </a:lnRef>
+          <a:fillRef idx="0">
+            <a:schemeClr val="dk1"/>
+          </a:fillRef>
+          <a:effectRef idx="0">
+            <a:schemeClr val="dk1"/>
+          </a:effectRef>
+          <a:fontRef idx="minor">
+            <a:schemeClr val="tx1"/>
+          </a:fontRef>
+        </p:style>
+      </p:cxnSp>
+      <p:cxnSp>
+        <p:nvCxnSpPr>
+          <p:cNvPr id="92" name="Straight Arrow Connector 91">
+            <a:extLst>
+              <a:ext uri="{FF2B5EF4-FFF2-40B4-BE49-F238E27FC236}">
+                <a16:creationId xmlns:a16="http://schemas.microsoft.com/office/drawing/2014/main" id="{7094F7A3-DFB2-CF4A-B564-DAB60EB92595}"/>
+              </a:ext>
+            </a:extLst>
+          </p:cNvPr>
+          <p:cNvCxnSpPr>
+            <a:cxnSpLocks/>
+          </p:cNvCxnSpPr>
+          <p:nvPr/>
+        </p:nvCxnSpPr>
+        <p:spPr>
+          <a:xfrm>
+            <a:off x="9409202" y="3095993"/>
+            <a:ext cx="513572" cy="0"/>
+          </a:xfrm>
+          <a:prstGeom prst="straightConnector1">
+            <a:avLst/>
+          </a:prstGeom>
+          <a:ln>
+            <a:tailEnd type="triangle"/>
+          </a:ln>
+        </p:spPr>
+        <p:style>
+          <a:lnRef idx="1">
+            <a:schemeClr val="dk1"/>
+          </a:lnRef>
+          <a:fillRef idx="0">
+            <a:schemeClr val="dk1"/>
+          </a:fillRef>
+          <a:effectRef idx="0">
+            <a:schemeClr val="dk1"/>
+          </a:effectRef>
+          <a:fontRef idx="minor">
+            <a:schemeClr val="tx1"/>
+          </a:fontRef>
+        </p:style>
+      </p:cxnSp>
+      <p:pic>
+        <p:nvPicPr>
+          <p:cNvPr id="1028" name="Picture 4" descr="What are the Key Azure Services for .NET developers? - Blogmepost">
+            <a:extLst>
+              <a:ext uri="{FF2B5EF4-FFF2-40B4-BE49-F238E27FC236}">
+                <a16:creationId xmlns:a16="http://schemas.microsoft.com/office/drawing/2014/main" id="{7D2B4E4E-CEBE-8140-9B87-67F38EB3A845}"/>
+              </a:ext>
+            </a:extLst>
+          </p:cNvPr>
+          <p:cNvPicPr>
+            <a:picLocks noChangeAspect="1" noChangeArrowheads="1"/>
+          </p:cNvPicPr>
+          <p:nvPr/>
+        </p:nvPicPr>
+        <p:blipFill>
+          <a:blip r:embed="rId21">
+            <a:extLst>
+              <a:ext uri="{BEBA8EAE-BF5A-486C-A8C5-ECC9F3942E4B}">
+                <a14:imgProps xmlns:a14="http://schemas.microsoft.com/office/drawing/2010/main">
+                  <a14:imgLayer r:embed="rId22">
+                    <a14:imgEffect>
+                      <a14:backgroundRemoval t="5778" b="96000" l="3111" r="93778">
+                        <a14:foregroundMark x1="24000" y1="44444" x2="24444" y2="56889"/>
+                        <a14:foregroundMark x1="8000" y1="40000" x2="7556" y2="64444"/>
+                        <a14:foregroundMark x1="7556" y1="64444" x2="10222" y2="68889"/>
+                        <a14:foregroundMark x1="33333" y1="26667" x2="54222" y2="18222"/>
+                        <a14:foregroundMark x1="54222" y1="18222" x2="71111" y2="30222"/>
+                        <a14:foregroundMark x1="71111" y1="30222" x2="79556" y2="48444"/>
+                        <a14:foregroundMark x1="79556" y1="48444" x2="75111" y2="89333"/>
+                        <a14:foregroundMark x1="75111" y1="89333" x2="54667" y2="93333"/>
+                        <a14:foregroundMark x1="54667" y1="93333" x2="34667" y2="85778"/>
+                        <a14:foregroundMark x1="34667" y1="85778" x2="32889" y2="83111"/>
+                        <a14:foregroundMark x1="84889" y1="77333" x2="89333" y2="59556"/>
+                        <a14:foregroundMark x1="89333" y1="59556" x2="86222" y2="40000"/>
+                        <a14:foregroundMark x1="86222" y1="40000" x2="46667" y2="8000"/>
+                        <a14:foregroundMark x1="38222" y1="5778" x2="56000" y2="5778"/>
+                        <a14:foregroundMark x1="56000" y1="5778" x2="59111" y2="6667"/>
+                        <a14:foregroundMark x1="86222" y1="39111" x2="92000" y2="60444"/>
+                        <a14:foregroundMark x1="90667" y1="45778" x2="92000" y2="58222"/>
+                        <a14:foregroundMark x1="93778" y1="48000" x2="93778" y2="54667"/>
+                        <a14:foregroundMark x1="92889" y1="46222" x2="93778" y2="55556"/>
+                        <a14:foregroundMark x1="54222" y1="95111" x2="39111" y2="96000"/>
+                        <a14:foregroundMark x1="27556" y1="59556" x2="25333" y2="35111"/>
+                        <a14:foregroundMark x1="23111" y1="40000" x2="12000" y2="58667"/>
+                        <a14:foregroundMark x1="3111" y1="56000" x2="3556" y2="50222"/>
+                      </a14:backgroundRemoval>
+                    </a14:imgEffect>
+                  </a14:imgLayer>
+                </a14:imgProps>
+              </a:ext>
+              <a:ext uri="{28A0092B-C50C-407E-A947-70E740481C1C}">
+                <a14:useLocalDpi xmlns:a14="http://schemas.microsoft.com/office/drawing/2010/main" val="0"/>
+              </a:ext>
+            </a:extLst>
+          </a:blip>
+          <a:srcRect/>
+          <a:stretch>
+            <a:fillRect/>
+          </a:stretch>
+        </p:blipFill>
+        <p:spPr bwMode="auto">
+          <a:xfrm>
+            <a:off x="10057388" y="2879278"/>
+            <a:ext cx="420231" cy="420231"/>
+          </a:xfrm>
+          <a:prstGeom prst="rect">
+            <a:avLst/>
+          </a:prstGeom>
+          <a:noFill/>
+          <a:extLst>
+            <a:ext uri="{909E8E84-426E-40DD-AFC4-6F175D3DCCD1}">
+              <a14:hiddenFill xmlns:a14="http://schemas.microsoft.com/office/drawing/2010/main">
+                <a:solidFill>
+                  <a:srgbClr val="FFFFFF"/>
+                </a:solidFill>
+              </a14:hiddenFill>
+            </a:ext>
+          </a:extLst>
+        </p:spPr>
+      </p:pic>
+      <p:pic>
+        <p:nvPicPr>
+          <p:cNvPr id="1030" name="Picture 6" descr="Working with the Azure Container Registry – Do You Cloud ?">
+            <a:extLst>
+              <a:ext uri="{FF2B5EF4-FFF2-40B4-BE49-F238E27FC236}">
+                <a16:creationId xmlns:a16="http://schemas.microsoft.com/office/drawing/2014/main" id="{8E6604FA-9C97-8444-8EAC-71065699944F}"/>
+              </a:ext>
+            </a:extLst>
+          </p:cNvPr>
+          <p:cNvPicPr>
+            <a:picLocks noChangeAspect="1" noChangeArrowheads="1"/>
+          </p:cNvPicPr>
+          <p:nvPr/>
+        </p:nvPicPr>
+        <p:blipFill rotWithShape="1">
+          <a:blip r:embed="rId23">
+            <a:extLst>
+              <a:ext uri="{BEBA8EAE-BF5A-486C-A8C5-ECC9F3942E4B}">
+                <a14:imgProps xmlns:a14="http://schemas.microsoft.com/office/drawing/2010/main">
+                  <a14:imgLayer r:embed="rId24">
+                    <a14:imgEffect>
+                      <a14:backgroundRemoval t="10000" b="90000" l="10000" r="90000">
+                        <a14:foregroundMark x1="46575" y1="10261" x2="51519" y2="10006"/>
+                        <a14:foregroundMark x1="53365" y1="47801" x2="83979" y2="48693"/>
+                        <a14:foregroundMark x1="50089" y1="42065" x2="49851" y2="56660"/>
+                        <a14:foregroundMark x1="50268" y1="48948" x2="53901" y2="64755"/>
+                        <a14:foregroundMark x1="53901" y1="64755" x2="50089" y2="69726"/>
+                        <a14:foregroundMark x1="47826" y1="63990" x2="62537" y2="67686"/>
+                        <a14:foregroundMark x1="62537" y1="67686" x2="77784" y2="65711"/>
+                      </a14:backgroundRemoval>
+                    </a14:imgEffect>
+                  </a14:imgLayer>
+                </a14:imgProps>
+              </a:ext>
+              <a:ext uri="{28A0092B-C50C-407E-A947-70E740481C1C}">
+                <a14:useLocalDpi xmlns:a14="http://schemas.microsoft.com/office/drawing/2010/main" val="0"/>
+              </a:ext>
+            </a:extLst>
+          </a:blip>
+          <a:srcRect l="8419" t="5728" r="12122" b="19669"/>
+          <a:stretch/>
+        </p:blipFill>
+        <p:spPr bwMode="auto">
+          <a:xfrm>
+            <a:off x="8678847" y="2811407"/>
+            <a:ext cx="586912" cy="514921"/>
+          </a:xfrm>
+          <a:prstGeom prst="rect">
+            <a:avLst/>
+          </a:prstGeom>
+          <a:noFill/>
+          <a:extLst>
+            <a:ext uri="{909E8E84-426E-40DD-AFC4-6F175D3DCCD1}">
+              <a14:hiddenFill xmlns:a14="http://schemas.microsoft.com/office/drawing/2010/main">
+                <a:solidFill>
+                  <a:srgbClr val="FFFFFF"/>
+                </a:solidFill>
+              </a14:hiddenFill>
+            </a:ext>
+          </a:extLst>
+        </p:spPr>
+      </p:pic>
+      <p:pic>
+        <p:nvPicPr>
+          <p:cNvPr id="1032" name="Picture 8" descr="Official Azure Icon Set">
+            <a:extLst>
+              <a:ext uri="{FF2B5EF4-FFF2-40B4-BE49-F238E27FC236}">
+                <a16:creationId xmlns:a16="http://schemas.microsoft.com/office/drawing/2014/main" id="{2FDAAF7C-6A2E-4D43-9E21-C44F283E24AF}"/>
+              </a:ext>
+            </a:extLst>
+          </p:cNvPr>
+          <p:cNvPicPr>
+            <a:picLocks noChangeAspect="1" noChangeArrowheads="1"/>
+          </p:cNvPicPr>
+          <p:nvPr/>
+        </p:nvPicPr>
+        <p:blipFill rotWithShape="1">
+          <a:blip r:embed="rId25">
+            <a:extLst>
+              <a:ext uri="{BEBA8EAE-BF5A-486C-A8C5-ECC9F3942E4B}">
+                <a14:imgProps xmlns:a14="http://schemas.microsoft.com/office/drawing/2010/main">
+                  <a14:imgLayer r:embed="rId26">
+                    <a14:imgEffect>
+                      <a14:backgroundRemoval t="5333" b="96000" l="9778" r="89778">
+                        <a14:foregroundMark x1="50222" y1="76000" x2="48444" y2="92889"/>
+                        <a14:foregroundMark x1="48444" y1="92889" x2="50222" y2="92444"/>
+                        <a14:foregroundMark x1="51556" y1="96444" x2="55111" y2="92000"/>
+                        <a14:foregroundMark x1="47111" y1="90667" x2="45333" y2="60889"/>
+                        <a14:foregroundMark x1="42222" y1="40000" x2="40889" y2="20889"/>
+                        <a14:foregroundMark x1="40889" y1="20889" x2="50667" y2="8000"/>
+                        <a14:foregroundMark x1="49778" y1="6222" x2="50667" y2="5333"/>
+                      </a14:backgroundRemoval>
+                    </a14:imgEffect>
+                  </a14:imgLayer>
+                </a14:imgProps>
+              </a:ext>
+              <a:ext uri="{28A0092B-C50C-407E-A947-70E740481C1C}">
+                <a14:useLocalDpi xmlns:a14="http://schemas.microsoft.com/office/drawing/2010/main" val="0"/>
+              </a:ext>
+            </a:extLst>
+          </a:blip>
+          <a:srcRect l="15080" r="15015"/>
+          <a:stretch/>
+        </p:blipFill>
+        <p:spPr bwMode="auto">
+          <a:xfrm>
+            <a:off x="11244861" y="2843501"/>
+            <a:ext cx="361962" cy="517789"/>
+          </a:xfrm>
+          <a:prstGeom prst="rect">
+            <a:avLst/>
+          </a:prstGeom>
+          <a:noFill/>
+          <a:extLst>
+            <a:ext uri="{909E8E84-426E-40DD-AFC4-6F175D3DCCD1}">
+              <a14:hiddenFill xmlns:a14="http://schemas.microsoft.com/office/drawing/2010/main">
+                <a:solidFill>
+                  <a:srgbClr val="FFFFFF"/>
+                </a:solidFill>
+              </a14:hiddenFill>
+            </a:ext>
+          </a:extLst>
+        </p:spPr>
+      </p:pic>
+      <p:sp>
+        <p:nvSpPr>
+          <p:cNvPr id="93" name="TextBox 92">
+            <a:extLst>
+              <a:ext uri="{FF2B5EF4-FFF2-40B4-BE49-F238E27FC236}">
+                <a16:creationId xmlns:a16="http://schemas.microsoft.com/office/drawing/2014/main" id="{80F44492-5C6E-A84E-8631-ADFB88AE11E3}"/>
+              </a:ext>
+            </a:extLst>
+          </p:cNvPr>
+          <p:cNvSpPr txBox="1"/>
+          <p:nvPr/>
+        </p:nvSpPr>
+        <p:spPr>
+          <a:xfrm>
+            <a:off x="10690562" y="3305061"/>
+            <a:ext cx="1265810" cy="261610"/>
+          </a:xfrm>
+          <a:prstGeom prst="rect">
+            <a:avLst/>
+          </a:prstGeom>
+          <a:noFill/>
+        </p:spPr>
+        <p:txBody>
+          <a:bodyPr wrap="square" rtlCol="0">
+            <a:spAutoFit/>
+          </a:bodyPr>
+          <a:lstStyle/>
+          <a:p>
+            <a:pPr algn="ctr"/>
+            <a:r>
+              <a:rPr lang="en-TH" sz="1100" dirty="0"/>
+              <a:t>Application Insight</a:t>
+            </a:r>
+          </a:p>
+        </p:txBody>
+      </p:sp>
+      <p:pic>
+        <p:nvPicPr>
+          <p:cNvPr id="1034" name="Picture 10" descr="How To Add Swagger-UI to PHP Server Code | by Tatiana Ensslin | Medium">
+            <a:extLst>
+              <a:ext uri="{FF2B5EF4-FFF2-40B4-BE49-F238E27FC236}">
+                <a16:creationId xmlns:a16="http://schemas.microsoft.com/office/drawing/2014/main" id="{177E2A39-6535-4F48-B1C8-E48A154618AD}"/>
+              </a:ext>
+            </a:extLst>
+          </p:cNvPr>
+          <p:cNvPicPr>
+            <a:picLocks noChangeAspect="1" noChangeArrowheads="1"/>
+          </p:cNvPicPr>
+          <p:nvPr/>
+        </p:nvPicPr>
+        <p:blipFill>
+          <a:blip r:embed="rId27">
+            <a:extLst>
+              <a:ext uri="{BEBA8EAE-BF5A-486C-A8C5-ECC9F3942E4B}">
+                <a14:imgProps xmlns:a14="http://schemas.microsoft.com/office/drawing/2010/main">
+                  <a14:imgLayer r:embed="rId28">
+                    <a14:imgEffect>
+                      <a14:backgroundRemoval t="8696" b="92308" l="7000" r="90000">
+                        <a14:foregroundMark x1="7333" y1="47826" x2="8000" y2="56187"/>
+                        <a14:foregroundMark x1="43667" y1="11037" x2="58333" y2="11037"/>
+                        <a14:foregroundMark x1="51333" y1="9365" x2="46000" y2="9030"/>
+                        <a14:foregroundMark x1="49667" y1="8696" x2="56667" y2="9699"/>
+                        <a14:foregroundMark x1="88667" y1="44816" x2="89000" y2="55184"/>
+                        <a14:foregroundMark x1="89333" y1="45485" x2="90000" y2="55518"/>
+                        <a14:foregroundMark x1="53333" y1="92308" x2="43000" y2="91639"/>
+                      </a14:backgroundRemoval>
+                    </a14:imgEffect>
+                  </a14:imgLayer>
+                </a14:imgProps>
+              </a:ext>
+              <a:ext uri="{28A0092B-C50C-407E-A947-70E740481C1C}">
+                <a14:useLocalDpi xmlns:a14="http://schemas.microsoft.com/office/drawing/2010/main" val="0"/>
+              </a:ext>
+            </a:extLst>
+          </a:blip>
+          <a:srcRect/>
+          <a:stretch>
+            <a:fillRect/>
+          </a:stretch>
+        </p:blipFill>
+        <p:spPr bwMode="auto">
+          <a:xfrm>
+            <a:off x="10070331" y="1513506"/>
+            <a:ext cx="499140" cy="497476"/>
+          </a:xfrm>
+          <a:prstGeom prst="rect">
+            <a:avLst/>
+          </a:prstGeom>
+          <a:noFill/>
+          <a:extLst>
+            <a:ext uri="{909E8E84-426E-40DD-AFC4-6F175D3DCCD1}">
+              <a14:hiddenFill xmlns:a14="http://schemas.microsoft.com/office/drawing/2010/main">
+                <a:solidFill>
+                  <a:srgbClr val="FFFFFF"/>
+                </a:solidFill>
+              </a14:hiddenFill>
+            </a:ext>
+          </a:extLst>
+        </p:spPr>
+      </p:pic>
+      <p:sp>
+        <p:nvSpPr>
+          <p:cNvPr id="95" name="TextBox 94">
+            <a:extLst>
+              <a:ext uri="{FF2B5EF4-FFF2-40B4-BE49-F238E27FC236}">
+                <a16:creationId xmlns:a16="http://schemas.microsoft.com/office/drawing/2014/main" id="{B7B97EB2-6A9F-6144-9D41-EA830A315CD0}"/>
+              </a:ext>
+            </a:extLst>
+          </p:cNvPr>
+          <p:cNvSpPr txBox="1"/>
+          <p:nvPr/>
+        </p:nvSpPr>
+        <p:spPr>
+          <a:xfrm>
+            <a:off x="9959668" y="1984267"/>
+            <a:ext cx="783868" cy="261610"/>
+          </a:xfrm>
+          <a:prstGeom prst="rect">
+            <a:avLst/>
+          </a:prstGeom>
+          <a:noFill/>
+        </p:spPr>
+        <p:txBody>
+          <a:bodyPr wrap="square" rtlCol="0">
+            <a:spAutoFit/>
+          </a:bodyPr>
+          <a:lstStyle/>
+          <a:p>
+            <a:pPr algn="ctr"/>
+            <a:r>
+              <a:rPr lang="en-TH" sz="1100" dirty="0"/>
+              <a:t>Swagger</a:t>
+            </a:r>
+          </a:p>
+        </p:txBody>
+      </p:sp>
+      <p:pic>
+        <p:nvPicPr>
+          <p:cNvPr id="20" name="Picture 12" descr="There isn&amp;#39;t Azure Private Endpoint icon · Issue #1143 · jgraph/drawio ·  GitHub">
+            <a:extLst>
+              <a:ext uri="{FF2B5EF4-FFF2-40B4-BE49-F238E27FC236}">
+                <a16:creationId xmlns:a16="http://schemas.microsoft.com/office/drawing/2014/main" id="{CA4A72C8-0D13-E449-B0B0-6EF14ACA1F76}"/>
+              </a:ext>
+            </a:extLst>
+          </p:cNvPr>
+          <p:cNvPicPr>
+            <a:picLocks noChangeAspect="1" noChangeArrowheads="1"/>
+          </p:cNvPicPr>
+          <p:nvPr/>
+        </p:nvPicPr>
+        <p:blipFill>
+          <a:blip r:embed="rId29">
+            <a:extLst>
+              <a:ext uri="{28A0092B-C50C-407E-A947-70E740481C1C}">
+                <a14:useLocalDpi xmlns:a14="http://schemas.microsoft.com/office/drawing/2010/main" val="0"/>
+              </a:ext>
+            </a:extLst>
+          </a:blip>
+          <a:srcRect/>
+          <a:stretch>
+            <a:fillRect/>
+          </a:stretch>
+        </p:blipFill>
+        <p:spPr bwMode="auto">
+          <a:xfrm>
+            <a:off x="10019492" y="4211535"/>
+            <a:ext cx="470999" cy="470999"/>
+          </a:xfrm>
+          <a:prstGeom prst="rect">
+            <a:avLst/>
+          </a:prstGeom>
+          <a:noFill/>
+          <a:extLst>
+            <a:ext uri="{909E8E84-426E-40DD-AFC4-6F175D3DCCD1}">
+              <a14:hiddenFill xmlns:a14="http://schemas.microsoft.com/office/drawing/2010/main">
+                <a:solidFill>
+                  <a:srgbClr val="FFFFFF"/>
+                </a:solidFill>
+              </a14:hiddenFill>
+            </a:ext>
+          </a:extLst>
+        </p:spPr>
+      </p:pic>
+      <p:sp>
+        <p:nvSpPr>
+          <p:cNvPr id="96" name="TextBox 95">
+            <a:extLst>
+              <a:ext uri="{FF2B5EF4-FFF2-40B4-BE49-F238E27FC236}">
+                <a16:creationId xmlns:a16="http://schemas.microsoft.com/office/drawing/2014/main" id="{41A1CAB7-C6A0-B340-B9C8-8EE01C5D253A}"/>
+              </a:ext>
+            </a:extLst>
+          </p:cNvPr>
+          <p:cNvSpPr txBox="1"/>
+          <p:nvPr/>
+        </p:nvSpPr>
+        <p:spPr>
+          <a:xfrm>
+            <a:off x="9560824" y="4655581"/>
+            <a:ext cx="1411609" cy="261610"/>
+          </a:xfrm>
+          <a:prstGeom prst="rect">
+            <a:avLst/>
+          </a:prstGeom>
+          <a:noFill/>
+        </p:spPr>
+        <p:txBody>
+          <a:bodyPr wrap="square" rtlCol="0">
+            <a:spAutoFit/>
+          </a:bodyPr>
+          <a:lstStyle/>
+          <a:p>
+            <a:pPr algn="ctr"/>
+            <a:r>
+              <a:rPr lang="en-TH" sz="1100" dirty="0"/>
+              <a:t>Model Endpoints</a:t>
+            </a:r>
+          </a:p>
+        </p:txBody>
+      </p:sp>
+      <p:cxnSp>
+        <p:nvCxnSpPr>
+          <p:cNvPr id="98" name="Straight Arrow Connector 97">
+            <a:extLst>
+              <a:ext uri="{FF2B5EF4-FFF2-40B4-BE49-F238E27FC236}">
+                <a16:creationId xmlns:a16="http://schemas.microsoft.com/office/drawing/2014/main" id="{752CFC1F-6E1F-A447-A23D-2605FA63DA8B}"/>
+              </a:ext>
+            </a:extLst>
+          </p:cNvPr>
+          <p:cNvCxnSpPr>
+            <a:cxnSpLocks/>
+          </p:cNvCxnSpPr>
+          <p:nvPr/>
+        </p:nvCxnSpPr>
+        <p:spPr>
+          <a:xfrm>
+            <a:off x="10622311" y="3104514"/>
+            <a:ext cx="513572" cy="0"/>
+          </a:xfrm>
+          <a:prstGeom prst="straightConnector1">
+            <a:avLst/>
+          </a:prstGeom>
+          <a:ln>
+            <a:tailEnd type="triangle"/>
+          </a:ln>
+        </p:spPr>
+        <p:style>
+          <a:lnRef idx="1">
+            <a:schemeClr val="dk1"/>
+          </a:lnRef>
+          <a:fillRef idx="0">
+            <a:schemeClr val="dk1"/>
+          </a:fillRef>
+          <a:effectRef idx="0">
+            <a:schemeClr val="dk1"/>
+          </a:effectRef>
+          <a:fontRef idx="minor">
+            <a:schemeClr val="tx1"/>
+          </a:fontRef>
+        </p:style>
+      </p:cxnSp>
+      <p:cxnSp>
+        <p:nvCxnSpPr>
+          <p:cNvPr id="22" name="Straight Arrow Connector 21">
+            <a:extLst>
+              <a:ext uri="{FF2B5EF4-FFF2-40B4-BE49-F238E27FC236}">
+                <a16:creationId xmlns:a16="http://schemas.microsoft.com/office/drawing/2014/main" id="{84A01468-34E2-7240-B2A6-FF84881ECC5A}"/>
+              </a:ext>
+            </a:extLst>
+          </p:cNvPr>
+          <p:cNvCxnSpPr/>
+          <p:nvPr/>
+        </p:nvCxnSpPr>
+        <p:spPr>
+          <a:xfrm flipV="1">
+            <a:off x="10288796" y="2235963"/>
+            <a:ext cx="0" cy="581591"/>
+          </a:xfrm>
+          <a:prstGeom prst="straightConnector1">
+            <a:avLst/>
+          </a:prstGeom>
+          <a:ln>
+            <a:tailEnd type="triangle"/>
+          </a:ln>
+        </p:spPr>
+        <p:style>
+          <a:lnRef idx="1">
+            <a:schemeClr val="dk1"/>
+          </a:lnRef>
+          <a:fillRef idx="0">
+            <a:schemeClr val="dk1"/>
+          </a:fillRef>
+          <a:effectRef idx="0">
+            <a:schemeClr val="dk1"/>
+          </a:effectRef>
+          <a:fontRef idx="minor">
+            <a:schemeClr val="tx1"/>
+          </a:fontRef>
+        </p:style>
+      </p:cxnSp>
+      <p:cxnSp>
+        <p:nvCxnSpPr>
+          <p:cNvPr id="99" name="Straight Arrow Connector 98">
+            <a:extLst>
+              <a:ext uri="{FF2B5EF4-FFF2-40B4-BE49-F238E27FC236}">
+                <a16:creationId xmlns:a16="http://schemas.microsoft.com/office/drawing/2014/main" id="{7713E0F6-BD8B-024B-9BEB-700725B7EB19}"/>
+              </a:ext>
+            </a:extLst>
+          </p:cNvPr>
+          <p:cNvCxnSpPr>
+            <a:cxnSpLocks/>
+          </p:cNvCxnSpPr>
+          <p:nvPr/>
+        </p:nvCxnSpPr>
+        <p:spPr>
+          <a:xfrm>
+            <a:off x="10266629" y="3566835"/>
+            <a:ext cx="0" cy="581591"/>
+          </a:xfrm>
+          <a:prstGeom prst="straightConnector1">
+            <a:avLst/>
+          </a:prstGeom>
+          <a:ln>
+            <a:tailEnd type="triangle"/>
+          </a:ln>
+        </p:spPr>
+        <p:style>
+          <a:lnRef idx="1">
+            <a:schemeClr val="dk1"/>
+          </a:lnRef>
+          <a:fillRef idx="0">
+            <a:schemeClr val="dk1"/>
+          </a:fillRef>
+          <a:effectRef idx="0">
+            <a:schemeClr val="dk1"/>
+          </a:effectRef>
+          <a:fontRef idx="minor">
+            <a:schemeClr val="tx1"/>
+          </a:fontRef>
+        </p:style>
+      </p:cxnSp>
+      <p:pic>
+        <p:nvPicPr>
+          <p:cNvPr id="24" name="Picture 14" descr="Font Awesome Computer Icons User Profile Users&amp;#39; Group, PNG, 512x512px, Font  Awesome, Aqua, Azure, Blue, Electric">
+            <a:extLst>
+              <a:ext uri="{FF2B5EF4-FFF2-40B4-BE49-F238E27FC236}">
+                <a16:creationId xmlns:a16="http://schemas.microsoft.com/office/drawing/2014/main" id="{A1CA5811-FF37-124B-BBF9-6A7844F50E9E}"/>
+              </a:ext>
+            </a:extLst>
+          </p:cNvPr>
+          <p:cNvPicPr>
+            <a:picLocks noChangeAspect="1" noChangeArrowheads="1"/>
+          </p:cNvPicPr>
+          <p:nvPr/>
+        </p:nvPicPr>
+        <p:blipFill rotWithShape="1">
+          <a:blip r:embed="rId30">
+            <a:extLst>
+              <a:ext uri="{BEBA8EAE-BF5A-486C-A8C5-ECC9F3942E4B}">
+                <a14:imgProps xmlns:a14="http://schemas.microsoft.com/office/drawing/2010/main">
+                  <a14:imgLayer r:embed="rId31">
+                    <a14:imgEffect>
+                      <a14:backgroundRemoval t="5859" b="93750" l="10000" r="90000">
+                        <a14:foregroundMark x1="28902" y1="22461" x2="28902" y2="22461"/>
+                        <a14:foregroundMark x1="29268" y1="48047" x2="30488" y2="48047"/>
+                        <a14:foregroundMark x1="50000" y1="39648" x2="50000" y2="39648"/>
+                        <a14:foregroundMark x1="67439" y1="20703" x2="67439" y2="20703"/>
+                        <a14:foregroundMark x1="73659" y1="41797" x2="73659" y2="41797"/>
+                        <a14:foregroundMark x1="44634" y1="93359" x2="51341" y2="93945"/>
+                        <a14:foregroundMark x1="51341" y1="93945" x2="59268" y2="93555"/>
+                        <a14:foregroundMark x1="30244" y1="5859" x2="30244" y2="5859"/>
+                      </a14:backgroundRemoval>
+                    </a14:imgEffect>
+                  </a14:imgLayer>
+                </a14:imgProps>
+              </a:ext>
+              <a:ext uri="{28A0092B-C50C-407E-A947-70E740481C1C}">
+                <a14:useLocalDpi xmlns:a14="http://schemas.microsoft.com/office/drawing/2010/main" val="0"/>
+              </a:ext>
+            </a:extLst>
+          </a:blip>
+          <a:srcRect l="16207" r="18569"/>
+          <a:stretch/>
+        </p:blipFill>
+        <p:spPr bwMode="auto">
+          <a:xfrm>
+            <a:off x="8362839" y="4200300"/>
+            <a:ext cx="617579" cy="591215"/>
+          </a:xfrm>
+          <a:prstGeom prst="rect">
+            <a:avLst/>
+          </a:prstGeom>
+          <a:noFill/>
+          <a:extLst>
+            <a:ext uri="{909E8E84-426E-40DD-AFC4-6F175D3DCCD1}">
+              <a14:hiddenFill xmlns:a14="http://schemas.microsoft.com/office/drawing/2010/main">
+                <a:solidFill>
+                  <a:srgbClr val="FFFFFF"/>
+                </a:solidFill>
+              </a14:hiddenFill>
+            </a:ext>
+          </a:extLst>
+        </p:spPr>
+      </p:pic>
+      <p:sp>
+        <p:nvSpPr>
+          <p:cNvPr id="100" name="TextBox 99">
+            <a:extLst>
+              <a:ext uri="{FF2B5EF4-FFF2-40B4-BE49-F238E27FC236}">
+                <a16:creationId xmlns:a16="http://schemas.microsoft.com/office/drawing/2014/main" id="{642B2A9C-0A78-B84B-B311-1B1E32DBC2D9}"/>
+              </a:ext>
+            </a:extLst>
+          </p:cNvPr>
+          <p:cNvSpPr txBox="1"/>
+          <p:nvPr/>
+        </p:nvSpPr>
+        <p:spPr>
+          <a:xfrm>
+            <a:off x="8385825" y="1132568"/>
+            <a:ext cx="2304737" cy="338554"/>
+          </a:xfrm>
+          <a:prstGeom prst="rect">
+            <a:avLst/>
+          </a:prstGeom>
+          <a:noFill/>
+        </p:spPr>
+        <p:txBody>
+          <a:bodyPr wrap="square" rtlCol="0">
+            <a:spAutoFit/>
+          </a:bodyPr>
+          <a:lstStyle/>
+          <a:p>
+            <a:pPr algn="ctr"/>
+            <a:r>
+              <a:rPr lang="en-US" sz="1600" b="1" u="sng" dirty="0"/>
+              <a:t>4. ) Model Deployment</a:t>
+            </a:r>
+            <a:endParaRPr lang="th-TH" sz="1600" b="1" u="sng" dirty="0"/>
+          </a:p>
+        </p:txBody>
+      </p:sp>
+      <p:sp>
+        <p:nvSpPr>
+          <p:cNvPr id="101" name="TextBox 100">
+            <a:extLst>
+              <a:ext uri="{FF2B5EF4-FFF2-40B4-BE49-F238E27FC236}">
+                <a16:creationId xmlns:a16="http://schemas.microsoft.com/office/drawing/2014/main" id="{1A5F5263-D5AE-D042-8CDD-E903F95DA33C}"/>
+              </a:ext>
+            </a:extLst>
+          </p:cNvPr>
+          <p:cNvSpPr txBox="1"/>
+          <p:nvPr/>
+        </p:nvSpPr>
+        <p:spPr>
+          <a:xfrm>
+            <a:off x="8180745" y="4779042"/>
+            <a:ext cx="1029199" cy="261610"/>
+          </a:xfrm>
+          <a:prstGeom prst="rect">
+            <a:avLst/>
+          </a:prstGeom>
+          <a:noFill/>
+        </p:spPr>
+        <p:txBody>
+          <a:bodyPr wrap="square" rtlCol="0">
+            <a:spAutoFit/>
+          </a:bodyPr>
+          <a:lstStyle/>
+          <a:p>
+            <a:pPr algn="ctr"/>
+            <a:r>
+              <a:rPr lang="en-TH" sz="1100" dirty="0"/>
+              <a:t>End User</a:t>
+            </a:r>
+          </a:p>
+        </p:txBody>
+      </p:sp>
+      <p:cxnSp>
+        <p:nvCxnSpPr>
+          <p:cNvPr id="102" name="Straight Arrow Connector 101">
+            <a:extLst>
+              <a:ext uri="{FF2B5EF4-FFF2-40B4-BE49-F238E27FC236}">
+                <a16:creationId xmlns:a16="http://schemas.microsoft.com/office/drawing/2014/main" id="{562CEEED-212F-A948-8F88-FF3A2B6F0A20}"/>
+              </a:ext>
+            </a:extLst>
+          </p:cNvPr>
+          <p:cNvCxnSpPr>
+            <a:cxnSpLocks/>
+          </p:cNvCxnSpPr>
+          <p:nvPr/>
+        </p:nvCxnSpPr>
+        <p:spPr>
+          <a:xfrm>
+            <a:off x="9050737" y="4442318"/>
+            <a:ext cx="430044" cy="0"/>
+          </a:xfrm>
+          <a:prstGeom prst="straightConnector1">
+            <a:avLst/>
+          </a:prstGeom>
+          <a:ln>
+            <a:tailEnd type="triangle"/>
+          </a:ln>
+        </p:spPr>
+        <p:style>
+          <a:lnRef idx="1">
+            <a:schemeClr val="dk1"/>
+          </a:lnRef>
+          <a:fillRef idx="0">
+            <a:schemeClr val="dk1"/>
+          </a:fillRef>
+          <a:effectRef idx="0">
+            <a:schemeClr val="dk1"/>
+          </a:effectRef>
+          <a:fontRef idx="minor">
+            <a:schemeClr val="tx1"/>
+          </a:fontRef>
+        </p:style>
+      </p:cxnSp>
+      <p:cxnSp>
+        <p:nvCxnSpPr>
+          <p:cNvPr id="103" name="Straight Arrow Connector 102">
+            <a:extLst>
+              <a:ext uri="{FF2B5EF4-FFF2-40B4-BE49-F238E27FC236}">
+                <a16:creationId xmlns:a16="http://schemas.microsoft.com/office/drawing/2014/main" id="{91662D48-A734-854D-A6F1-5A62308E5A61}"/>
+              </a:ext>
+            </a:extLst>
+          </p:cNvPr>
+          <p:cNvCxnSpPr>
+            <a:cxnSpLocks/>
+          </p:cNvCxnSpPr>
+          <p:nvPr/>
+        </p:nvCxnSpPr>
+        <p:spPr>
+          <a:xfrm flipH="1">
+            <a:off x="9050737" y="4636794"/>
+            <a:ext cx="430044" cy="0"/>
+          </a:xfrm>
+          <a:prstGeom prst="straightConnector1">
+            <a:avLst/>
           </a:prstGeom>
           <a:ln>
             <a:tailEnd type="triangle"/>
@@ -5689,224 +6279,6 @@
     <p:extLst>
       <p:ext uri="{BB962C8B-B14F-4D97-AF65-F5344CB8AC3E}">
         <p14:creationId xmlns:p14="http://schemas.microsoft.com/office/powerpoint/2010/main" val="1001866802"/>
-      </p:ext>
-    </p:extLst>
-  </p:cSld>
-  <p:clrMapOvr>
-    <a:masterClrMapping/>
-  </p:clrMapOvr>
-</p:sld>
-</file>
-
-<file path=ppt/slides/slide2.xml><?xml version="1.0" encoding="utf-8"?>
-<p:sld xmlns:a="http://schemas.openxmlformats.org/drawingml/2006/main" xmlns:r="http://schemas.openxmlformats.org/officeDocument/2006/relationships" xmlns:p="http://schemas.openxmlformats.org/presentationml/2006/main">
-  <p:cSld>
-    <p:bg>
-      <p:bgPr>
-        <a:solidFill>
-          <a:schemeClr val="bg1"/>
-        </a:solidFill>
-        <a:effectLst/>
-      </p:bgPr>
-    </p:bg>
-    <p:spTree>
-      <p:nvGrpSpPr>
-        <p:cNvPr id="1" name=""/>
-        <p:cNvGrpSpPr/>
-        <p:nvPr/>
-      </p:nvGrpSpPr>
-      <p:grpSpPr>
-        <a:xfrm>
-          <a:off x="0" y="0"/>
-          <a:ext cx="0" cy="0"/>
-          <a:chOff x="0" y="0"/>
-          <a:chExt cx="0" cy="0"/>
-        </a:xfrm>
-      </p:grpSpPr>
-      <p:pic>
-        <p:nvPicPr>
-          <p:cNvPr id="31" name="Graphic 30">
-            <a:extLst>
-              <a:ext uri="{FF2B5EF4-FFF2-40B4-BE49-F238E27FC236}">
-                <a16:creationId xmlns:a16="http://schemas.microsoft.com/office/drawing/2014/main" id="{BA519C2D-EB72-A542-AFF8-DA2C3200B684}"/>
-              </a:ext>
-            </a:extLst>
-          </p:cNvPr>
-          <p:cNvPicPr>
-            <a:picLocks noChangeAspect="1"/>
-          </p:cNvPicPr>
-          <p:nvPr/>
-        </p:nvPicPr>
-        <p:blipFill>
-          <a:blip r:embed="rId2">
-            <a:extLst>
-              <a:ext uri="{96DAC541-7B7A-43D3-8B79-37D633B846F1}">
-                <asvg:svgBlip xmlns:asvg="http://schemas.microsoft.com/office/drawing/2016/SVG/main" r:embed="rId3"/>
-              </a:ext>
-            </a:extLst>
-          </a:blip>
-          <a:stretch>
-            <a:fillRect/>
-          </a:stretch>
-        </p:blipFill>
-        <p:spPr>
-          <a:xfrm>
-            <a:off x="951021" y="611802"/>
-            <a:ext cx="2624663" cy="2624663"/>
-          </a:xfrm>
-          <a:prstGeom prst="rect">
-            <a:avLst/>
-          </a:prstGeom>
-        </p:spPr>
-      </p:pic>
-      <p:pic>
-        <p:nvPicPr>
-          <p:cNvPr id="29" name="Graphic 28">
-            <a:extLst>
-              <a:ext uri="{FF2B5EF4-FFF2-40B4-BE49-F238E27FC236}">
-                <a16:creationId xmlns:a16="http://schemas.microsoft.com/office/drawing/2014/main" id="{92B7837A-03C9-F94B-859D-52A7203240AC}"/>
-              </a:ext>
-            </a:extLst>
-          </p:cNvPr>
-          <p:cNvPicPr>
-            <a:picLocks noChangeAspect="1"/>
-          </p:cNvPicPr>
-          <p:nvPr/>
-        </p:nvPicPr>
-        <p:blipFill>
-          <a:blip r:embed="rId4">
-            <a:extLst>
-              <a:ext uri="{96DAC541-7B7A-43D3-8B79-37D633B846F1}">
-                <asvg:svgBlip xmlns:asvg="http://schemas.microsoft.com/office/drawing/2016/SVG/main" r:embed="rId5"/>
-              </a:ext>
-            </a:extLst>
-          </a:blip>
-          <a:stretch>
-            <a:fillRect/>
-          </a:stretch>
-        </p:blipFill>
-        <p:spPr>
-          <a:xfrm>
-            <a:off x="8616317" y="643466"/>
-            <a:ext cx="2624662" cy="2624662"/>
-          </a:xfrm>
-          <a:prstGeom prst="rect">
-            <a:avLst/>
-          </a:prstGeom>
-        </p:spPr>
-      </p:pic>
-      <p:pic>
-        <p:nvPicPr>
-          <p:cNvPr id="33" name="Graphic 32">
-            <a:extLst>
-              <a:ext uri="{FF2B5EF4-FFF2-40B4-BE49-F238E27FC236}">
-                <a16:creationId xmlns:a16="http://schemas.microsoft.com/office/drawing/2014/main" id="{1C96D818-1650-0349-9960-E588445892AB}"/>
-              </a:ext>
-            </a:extLst>
-          </p:cNvPr>
-          <p:cNvPicPr>
-            <a:picLocks noChangeAspect="1"/>
-          </p:cNvPicPr>
-          <p:nvPr/>
-        </p:nvPicPr>
-        <p:blipFill>
-          <a:blip r:embed="rId6">
-            <a:extLst>
-              <a:ext uri="{96DAC541-7B7A-43D3-8B79-37D633B846F1}">
-                <asvg:svgBlip xmlns:asvg="http://schemas.microsoft.com/office/drawing/2016/SVG/main" r:embed="rId7"/>
-              </a:ext>
-            </a:extLst>
-          </a:blip>
-          <a:stretch>
-            <a:fillRect/>
-          </a:stretch>
-        </p:blipFill>
-        <p:spPr>
-          <a:xfrm>
-            <a:off x="970280" y="3589863"/>
-            <a:ext cx="2624665" cy="2624665"/>
-          </a:xfrm>
-          <a:prstGeom prst="rect">
-            <a:avLst/>
-          </a:prstGeom>
-        </p:spPr>
-      </p:pic>
-      <p:pic>
-        <p:nvPicPr>
-          <p:cNvPr id="35" name="Graphic 34">
-            <a:extLst>
-              <a:ext uri="{FF2B5EF4-FFF2-40B4-BE49-F238E27FC236}">
-                <a16:creationId xmlns:a16="http://schemas.microsoft.com/office/drawing/2014/main" id="{E32DE30D-E4FA-6448-9FB4-6386C26C4BBB}"/>
-              </a:ext>
-            </a:extLst>
-          </p:cNvPr>
-          <p:cNvPicPr>
-            <a:picLocks noChangeAspect="1"/>
-          </p:cNvPicPr>
-          <p:nvPr/>
-        </p:nvPicPr>
-        <p:blipFill>
-          <a:blip r:embed="rId8">
-            <a:extLst>
-              <a:ext uri="{96DAC541-7B7A-43D3-8B79-37D633B846F1}">
-                <asvg:svgBlip xmlns:asvg="http://schemas.microsoft.com/office/drawing/2016/SVG/main" r:embed="rId9"/>
-              </a:ext>
-            </a:extLst>
-          </a:blip>
-          <a:stretch>
-            <a:fillRect/>
-          </a:stretch>
-        </p:blipFill>
-        <p:spPr>
-          <a:xfrm>
-            <a:off x="4793266" y="3589863"/>
-            <a:ext cx="2643993" cy="2643993"/>
-          </a:xfrm>
-          <a:prstGeom prst="rect">
-            <a:avLst/>
-          </a:prstGeom>
-        </p:spPr>
-      </p:pic>
-      <p:pic>
-        <p:nvPicPr>
-          <p:cNvPr id="27" name="Graphic 26">
-            <a:extLst>
-              <a:ext uri="{FF2B5EF4-FFF2-40B4-BE49-F238E27FC236}">
-                <a16:creationId xmlns:a16="http://schemas.microsoft.com/office/drawing/2014/main" id="{060DB71E-65E2-B84A-8704-6892B11C1859}"/>
-              </a:ext>
-            </a:extLst>
-          </p:cNvPr>
-          <p:cNvPicPr>
-            <a:picLocks noChangeAspect="1"/>
-          </p:cNvPicPr>
-          <p:nvPr/>
-        </p:nvPicPr>
-        <p:blipFill>
-          <a:blip r:embed="rId10">
-            <a:extLst>
-              <a:ext uri="{96DAC541-7B7A-43D3-8B79-37D633B846F1}">
-                <asvg:svgBlip xmlns:asvg="http://schemas.microsoft.com/office/drawing/2016/SVG/main" r:embed="rId11"/>
-              </a:ext>
-            </a:extLst>
-          </a:blip>
-          <a:stretch>
-            <a:fillRect/>
-          </a:stretch>
-        </p:blipFill>
-        <p:spPr>
-          <a:xfrm>
-            <a:off x="8606651" y="3589863"/>
-            <a:ext cx="2643992" cy="2643992"/>
-          </a:xfrm>
-          <a:prstGeom prst="rect">
-            <a:avLst/>
-          </a:prstGeom>
-        </p:spPr>
-      </p:pic>
-    </p:spTree>
-    <p:extLst>
-      <p:ext uri="{BB962C8B-B14F-4D97-AF65-F5344CB8AC3E}">
-        <p14:creationId xmlns:p14="http://schemas.microsoft.com/office/powerpoint/2010/main" val="397691902"/>
       </p:ext>
     </p:extLst>
   </p:cSld>

</xml_diff>